<commit_message>
after Discussing with collaborators
</commit_message>
<xml_diff>
--- a/doc/第57回プログラミング・シンポジウム/posterPresentationOn8Jan2016/posterAtProgrammingSymposium20160108.pptx
+++ b/doc/第57回プログラミング・シンポジウム/posterPresentationOn8Jan2016/posterAtProgrammingSymposium20160108.pptx
@@ -193,7 +193,7 @@
           <a:p>
             <a:fld id="{90664597-D5B9-441D-B334-54BF5E64E4CD}" type="datetimeFigureOut">
               <a:rPr kumimoji="1" lang="ja-JP" altLang="en-US" smtClean="0"/>
-              <a:t>2016/1/6</a:t>
+              <a:t>2016/1/7</a:t>
             </a:fld>
             <a:endParaRPr kumimoji="1" lang="ja-JP" altLang="en-US"/>
           </a:p>
@@ -758,7 +758,7 @@
           <a:p>
             <a:fld id="{E35EBEA3-0A79-4AA1-A3FE-99F1691C5C28}" type="datetimeFigureOut">
               <a:rPr kumimoji="1" lang="ja-JP" altLang="en-US" smtClean="0"/>
-              <a:t>2016/1/6</a:t>
+              <a:t>2016/1/7</a:t>
             </a:fld>
             <a:endParaRPr kumimoji="1" lang="ja-JP" altLang="en-US"/>
           </a:p>
@@ -960,7 +960,7 @@
           <a:p>
             <a:fld id="{E35EBEA3-0A79-4AA1-A3FE-99F1691C5C28}" type="datetimeFigureOut">
               <a:rPr kumimoji="1" lang="ja-JP" altLang="en-US" smtClean="0"/>
-              <a:t>2016/1/6</a:t>
+              <a:t>2016/1/7</a:t>
             </a:fld>
             <a:endParaRPr kumimoji="1" lang="ja-JP" altLang="en-US"/>
           </a:p>
@@ -1172,7 +1172,7 @@
           <a:p>
             <a:fld id="{E35EBEA3-0A79-4AA1-A3FE-99F1691C5C28}" type="datetimeFigureOut">
               <a:rPr kumimoji="1" lang="ja-JP" altLang="en-US" smtClean="0"/>
-              <a:t>2016/1/6</a:t>
+              <a:t>2016/1/7</a:t>
             </a:fld>
             <a:endParaRPr kumimoji="1" lang="ja-JP" altLang="en-US"/>
           </a:p>
@@ -1374,7 +1374,7 @@
           <a:p>
             <a:fld id="{E35EBEA3-0A79-4AA1-A3FE-99F1691C5C28}" type="datetimeFigureOut">
               <a:rPr kumimoji="1" lang="ja-JP" altLang="en-US" smtClean="0"/>
-              <a:t>2016/1/6</a:t>
+              <a:t>2016/1/7</a:t>
             </a:fld>
             <a:endParaRPr kumimoji="1" lang="ja-JP" altLang="en-US"/>
           </a:p>
@@ -1620,7 +1620,7 @@
           <a:p>
             <a:fld id="{E35EBEA3-0A79-4AA1-A3FE-99F1691C5C28}" type="datetimeFigureOut">
               <a:rPr kumimoji="1" lang="ja-JP" altLang="en-US" smtClean="0"/>
-              <a:t>2016/1/6</a:t>
+              <a:t>2016/1/7</a:t>
             </a:fld>
             <a:endParaRPr kumimoji="1" lang="ja-JP" altLang="en-US"/>
           </a:p>
@@ -2466,7 +2466,7 @@
           <a:p>
             <a:fld id="{E35EBEA3-0A79-4AA1-A3FE-99F1691C5C28}" type="datetimeFigureOut">
               <a:rPr kumimoji="1" lang="ja-JP" altLang="en-US" smtClean="0"/>
-              <a:t>2016/1/6</a:t>
+              <a:t>2016/1/7</a:t>
             </a:fld>
             <a:endParaRPr kumimoji="1" lang="ja-JP" altLang="en-US"/>
           </a:p>
@@ -2591,7 +2591,7 @@
           <a:p>
             <a:fld id="{E35EBEA3-0A79-4AA1-A3FE-99F1691C5C28}" type="datetimeFigureOut">
               <a:rPr kumimoji="1" lang="ja-JP" altLang="en-US" smtClean="0"/>
-              <a:t>2016/1/6</a:t>
+              <a:t>2016/1/7</a:t>
             </a:fld>
             <a:endParaRPr kumimoji="1" lang="ja-JP" altLang="en-US"/>
           </a:p>
@@ -2693,7 +2693,7 @@
           <a:p>
             <a:fld id="{E35EBEA3-0A79-4AA1-A3FE-99F1691C5C28}" type="datetimeFigureOut">
               <a:rPr kumimoji="1" lang="ja-JP" altLang="en-US" smtClean="0"/>
-              <a:t>2016/1/6</a:t>
+              <a:t>2016/1/7</a:t>
             </a:fld>
             <a:endParaRPr kumimoji="1" lang="ja-JP" altLang="en-US"/>
           </a:p>
@@ -3009,7 +3009,7 @@
           <a:p>
             <a:fld id="{E35EBEA3-0A79-4AA1-A3FE-99F1691C5C28}" type="datetimeFigureOut">
               <a:rPr kumimoji="1" lang="ja-JP" altLang="en-US" smtClean="0"/>
-              <a:t>2016/1/6</a:t>
+              <a:t>2016/1/7</a:t>
             </a:fld>
             <a:endParaRPr kumimoji="1" lang="ja-JP" altLang="en-US"/>
           </a:p>
@@ -3269,7 +3269,7 @@
           <a:p>
             <a:fld id="{E35EBEA3-0A79-4AA1-A3FE-99F1691C5C28}" type="datetimeFigureOut">
               <a:rPr kumimoji="1" lang="ja-JP" altLang="en-US" smtClean="0"/>
-              <a:t>2016/1/6</a:t>
+              <a:t>2016/1/7</a:t>
             </a:fld>
             <a:endParaRPr kumimoji="1" lang="ja-JP" altLang="en-US"/>
           </a:p>
@@ -3514,7 +3514,7 @@
           <a:p>
             <a:fld id="{E35EBEA3-0A79-4AA1-A3FE-99F1691C5C28}" type="datetimeFigureOut">
               <a:rPr kumimoji="1" lang="ja-JP" altLang="en-US" smtClean="0"/>
-              <a:t>2016/1/6</a:t>
+              <a:t>2016/1/7</a:t>
             </a:fld>
             <a:endParaRPr kumimoji="1" lang="ja-JP" altLang="en-US"/>
           </a:p>
@@ -3904,7 +3904,7 @@
         </p:nvSpPr>
         <p:spPr>
           <a:xfrm>
-            <a:off x="15516795" y="18667958"/>
+            <a:off x="15716051" y="29024916"/>
             <a:ext cx="13177464" cy="2892514"/>
           </a:xfrm>
           <a:prstGeom prst="roundRect">
@@ -3913,10 +3913,7 @@
           <a:noFill/>
           <a:ln>
             <a:solidFill>
-              <a:schemeClr val="tx1">
-                <a:lumMod val="65000"/>
-                <a:lumOff val="35000"/>
-              </a:schemeClr>
+              <a:srgbClr val="00B050"/>
             </a:solidFill>
             <a:prstDash val="sysDash"/>
           </a:ln>
@@ -4009,8 +4006,8 @@
         </p:nvSpPr>
         <p:spPr>
           <a:xfrm>
-            <a:off x="1154263" y="18379926"/>
-            <a:ext cx="13373656" cy="6082165"/>
+            <a:off x="1154263" y="20618053"/>
+            <a:ext cx="13373656" cy="4530625"/>
           </a:xfrm>
         </p:spPr>
         <p:txBody>
@@ -4023,43 +4020,10 @@
               <a:buNone/>
             </a:pPr>
             <a:r>
-              <a:rPr lang="en-US" altLang="ja-JP" sz="3600" b="1" dirty="0" smtClean="0"/>
-              <a:t>DSL</a:t>
-            </a:r>
-            <a:r>
               <a:rPr lang="ja-JP" altLang="en-US" sz="3600" b="1" dirty="0" smtClean="0"/>
-              <a:t>の目的</a:t>
-            </a:r>
-            <a:endParaRPr lang="en-US" altLang="ja-JP" sz="3600" b="1" dirty="0" smtClean="0"/>
-          </a:p>
-          <a:p>
-            <a:r>
-              <a:rPr lang="ja-JP" altLang="en-US" sz="3600" dirty="0" smtClean="0"/>
-              <a:t>人が研究</a:t>
-            </a:r>
-            <a:r>
-              <a:rPr lang="ja-JP" altLang="en-US" sz="3600" dirty="0"/>
-              <a:t>開発</a:t>
-            </a:r>
-            <a:r>
-              <a:rPr lang="ja-JP" altLang="en-US" sz="3600" dirty="0" smtClean="0"/>
-              <a:t>に専念</a:t>
-            </a:r>
-            <a:r>
-              <a:rPr lang="ja-JP" altLang="en-US" sz="3600" dirty="0"/>
-              <a:t>するために</a:t>
-            </a:r>
-            <a:r>
-              <a:rPr lang="ja-JP" altLang="en-US" sz="3600" dirty="0" smtClean="0"/>
-              <a:t>、機械に定型作業を</a:t>
-            </a:r>
-            <a:endParaRPr lang="en-US" altLang="ja-JP" sz="3600" dirty="0" smtClean="0"/>
-          </a:p>
-          <a:p>
-            <a:pPr marL="0" indent="0">
-              <a:buNone/>
-            </a:pPr>
-            <a:endParaRPr lang="en-US" altLang="ja-JP" sz="1400" dirty="0" smtClean="0">
+              <a:t>なぜ埋め込み型？</a:t>
+            </a:r>
+            <a:endParaRPr lang="en-US" altLang="ja-JP" sz="3600" b="1" dirty="0" smtClean="0">
               <a:solidFill>
                 <a:srgbClr val="FF0000"/>
               </a:solidFill>
@@ -4071,7 +4035,7 @@
               <a:buAutoNum type="arabicPeriod"/>
             </a:pPr>
             <a:r>
-              <a:rPr lang="ja-JP" altLang="en-US" sz="3800" dirty="0" smtClean="0">
+              <a:rPr lang="ja-JP" altLang="en-US" sz="3200" dirty="0" smtClean="0">
                 <a:solidFill>
                   <a:srgbClr val="FF0000"/>
                 </a:solidFill>
@@ -4079,27 +4043,27 @@
               <a:t>独立型</a:t>
             </a:r>
             <a:r>
-              <a:rPr lang="ja-JP" altLang="en-US" sz="3800" dirty="0" smtClean="0"/>
+              <a:rPr lang="ja-JP" altLang="en-US" sz="3200" dirty="0" smtClean="0"/>
               <a:t> </a:t>
             </a:r>
             <a:r>
-              <a:rPr lang="en-US" altLang="ja-JP" sz="3800" dirty="0" smtClean="0"/>
+              <a:rPr lang="en-US" altLang="ja-JP" sz="3200" dirty="0" smtClean="0"/>
               <a:t>DSL</a:t>
             </a:r>
             <a:r>
-              <a:rPr lang="ja-JP" altLang="en-US" sz="3800" dirty="0" smtClean="0"/>
+              <a:rPr lang="ja-JP" altLang="en-US" sz="3200" dirty="0" smtClean="0"/>
               <a:t> </a:t>
             </a:r>
             <a:r>
-              <a:rPr lang="en-US" altLang="ja-JP" sz="3800" dirty="0" smtClean="0"/>
+              <a:rPr lang="en-US" altLang="ja-JP" sz="3200" dirty="0" smtClean="0"/>
               <a:t> :  </a:t>
             </a:r>
             <a:r>
-              <a:rPr lang="ja-JP" altLang="en-US" sz="3800" dirty="0" smtClean="0"/>
+              <a:rPr lang="ja-JP" altLang="en-US" sz="3200" dirty="0" smtClean="0"/>
               <a:t>実装</a:t>
             </a:r>
             <a:r>
-              <a:rPr lang="ja-JP" altLang="en-US" sz="3800" dirty="0" smtClean="0">
+              <a:rPr lang="ja-JP" altLang="en-US" sz="3200" dirty="0" smtClean="0">
                 <a:solidFill>
                   <a:srgbClr val="FF0000"/>
                 </a:solidFill>
@@ -4107,26 +4071,26 @@
               <a:t>コスト高い</a:t>
             </a:r>
             <a:r>
-              <a:rPr lang="ja-JP" altLang="en-US" sz="3800" dirty="0" smtClean="0"/>
+              <a:rPr lang="ja-JP" altLang="en-US" sz="3200" dirty="0" smtClean="0"/>
               <a:t>。</a:t>
             </a:r>
-            <a:endParaRPr lang="en-US" altLang="ja-JP" sz="3800" dirty="0" smtClean="0"/>
+            <a:endParaRPr lang="en-US" altLang="ja-JP" sz="3200" dirty="0" smtClean="0"/>
           </a:p>
           <a:p>
             <a:pPr lvl="1"/>
             <a:r>
-              <a:rPr lang="en-US" altLang="ja-JP" dirty="0" smtClean="0"/>
+              <a:rPr lang="en-US" altLang="ja-JP" sz="3200" dirty="0" smtClean="0"/>
               <a:t>Fortran : </a:t>
             </a:r>
             <a:r>
-              <a:rPr lang="ja-JP" altLang="en-US" dirty="0"/>
+              <a:rPr lang="ja-JP" altLang="en-US" sz="3200" dirty="0"/>
               <a:t>モデリング</a:t>
             </a:r>
             <a:r>
-              <a:rPr lang="ja-JP" altLang="en-US" dirty="0" smtClean="0"/>
+              <a:rPr lang="ja-JP" altLang="en-US" sz="3200" dirty="0" smtClean="0"/>
               <a:t>手法固有の数式変換はサポート外</a:t>
             </a:r>
-            <a:endParaRPr lang="en-US" altLang="ja-JP" dirty="0" smtClean="0"/>
+            <a:endParaRPr lang="en-US" altLang="ja-JP" sz="3200" dirty="0" smtClean="0"/>
           </a:p>
           <a:p>
             <a:pPr marL="742950" indent="-742950">
@@ -4134,7 +4098,7 @@
               <a:buAutoNum type="arabicPeriod"/>
             </a:pPr>
             <a:r>
-              <a:rPr lang="ja-JP" altLang="en-US" sz="3800" dirty="0" smtClean="0">
+              <a:rPr lang="ja-JP" altLang="en-US" sz="3200" dirty="0" smtClean="0">
                 <a:solidFill>
                   <a:srgbClr val="0070C0"/>
                 </a:solidFill>
@@ -4142,26 +4106,26 @@
               <a:t>埋め込み型</a:t>
             </a:r>
             <a:r>
-              <a:rPr lang="ja-JP" altLang="en-US" sz="3800" dirty="0" smtClean="0"/>
+              <a:rPr lang="ja-JP" altLang="en-US" sz="3200" dirty="0" smtClean="0"/>
               <a:t> </a:t>
             </a:r>
             <a:r>
-              <a:rPr lang="en-US" altLang="ja-JP" sz="3800" dirty="0" smtClean="0"/>
+              <a:rPr lang="en-US" altLang="ja-JP" sz="3200" dirty="0" smtClean="0"/>
               <a:t>DSL : </a:t>
             </a:r>
             <a:r>
-              <a:rPr lang="ja-JP" altLang="en-US" sz="3800" dirty="0" smtClean="0"/>
+              <a:rPr lang="ja-JP" altLang="en-US" sz="3200" dirty="0" smtClean="0"/>
               <a:t>実装</a:t>
             </a:r>
             <a:r>
-              <a:rPr lang="ja-JP" altLang="en-US" sz="3800" dirty="0" smtClean="0">
+              <a:rPr lang="ja-JP" altLang="en-US" sz="3200" dirty="0" smtClean="0">
                 <a:solidFill>
                   <a:srgbClr val="0070C0"/>
                 </a:solidFill>
               </a:rPr>
               <a:t>コスト低い</a:t>
             </a:r>
-            <a:endParaRPr lang="en-US" altLang="ja-JP" sz="3800" dirty="0">
+            <a:endParaRPr lang="en-US" altLang="ja-JP" sz="3200" dirty="0">
               <a:solidFill>
                 <a:srgbClr val="0070C0"/>
               </a:solidFill>
@@ -4170,61 +4134,61 @@
           <a:p>
             <a:pPr lvl="1"/>
             <a:r>
-              <a:rPr lang="ja-JP" altLang="en-US" dirty="0"/>
+              <a:rPr lang="ja-JP" altLang="en-US" sz="3200" dirty="0"/>
               <a:t>モデリング</a:t>
             </a:r>
             <a:r>
-              <a:rPr lang="ja-JP" altLang="en-US" dirty="0" smtClean="0"/>
+              <a:rPr lang="ja-JP" altLang="en-US" sz="3200" dirty="0" smtClean="0"/>
               <a:t>手法ごとに</a:t>
             </a:r>
             <a:r>
-              <a:rPr lang="en-US" altLang="ja-JP" dirty="0" smtClean="0"/>
+              <a:rPr lang="en-US" altLang="ja-JP" sz="3200" dirty="0" smtClean="0"/>
               <a:t>DSL</a:t>
             </a:r>
             <a:r>
-              <a:rPr lang="ja-JP" altLang="en-US" dirty="0" smtClean="0"/>
+              <a:rPr lang="ja-JP" altLang="en-US" sz="3200" dirty="0" smtClean="0"/>
               <a:t>が開発されつつある。</a:t>
             </a:r>
-            <a:endParaRPr lang="en-US" altLang="ja-JP" dirty="0" smtClean="0"/>
+            <a:endParaRPr lang="en-US" altLang="ja-JP" sz="3200" dirty="0" smtClean="0"/>
           </a:p>
           <a:p>
             <a:pPr lvl="2"/>
             <a:r>
-              <a:rPr lang="ja-JP" altLang="en-US" dirty="0"/>
+              <a:rPr lang="ja-JP" altLang="en-US" sz="3200" dirty="0"/>
               <a:t>有限</a:t>
             </a:r>
             <a:r>
-              <a:rPr lang="ja-JP" altLang="en-US" dirty="0" smtClean="0"/>
+              <a:rPr lang="ja-JP" altLang="en-US" sz="3200" dirty="0" smtClean="0"/>
               <a:t>要素法</a:t>
             </a:r>
             <a:r>
-              <a:rPr lang="en-US" altLang="ja-JP" dirty="0"/>
+              <a:rPr lang="en-US" altLang="ja-JP" sz="3200" dirty="0"/>
               <a:t> </a:t>
             </a:r>
             <a:r>
-              <a:rPr lang="en-US" altLang="ja-JP" dirty="0" smtClean="0"/>
+              <a:rPr lang="en-US" altLang="ja-JP" sz="3200" dirty="0" smtClean="0"/>
               <a:t>: Feel++, </a:t>
             </a:r>
             <a:r>
-              <a:rPr lang="en-US" altLang="ja-JP" dirty="0" err="1" smtClean="0"/>
+              <a:rPr lang="en-US" altLang="ja-JP" sz="3200" dirty="0" err="1" smtClean="0"/>
               <a:t>COOLFLuiD</a:t>
             </a:r>
             <a:r>
-              <a:rPr lang="en-US" altLang="ja-JP" dirty="0" smtClean="0"/>
+              <a:rPr lang="en-US" altLang="ja-JP" sz="3200" dirty="0" smtClean="0"/>
               <a:t>, …</a:t>
             </a:r>
           </a:p>
           <a:p>
             <a:pPr lvl="2"/>
             <a:r>
-              <a:rPr lang="ja-JP" altLang="en-US" dirty="0"/>
+              <a:rPr lang="ja-JP" altLang="en-US" sz="3200" dirty="0"/>
               <a:t>有限</a:t>
             </a:r>
             <a:r>
-              <a:rPr lang="ja-JP" altLang="en-US" dirty="0" smtClean="0"/>
+              <a:rPr lang="ja-JP" altLang="en-US" sz="3200" dirty="0" smtClean="0"/>
               <a:t>体積法 →　本発表</a:t>
             </a:r>
-            <a:endParaRPr lang="en-US" altLang="ja-JP" dirty="0" smtClean="0"/>
+            <a:endParaRPr lang="en-US" altLang="ja-JP" sz="3200" dirty="0" smtClean="0"/>
           </a:p>
           <a:p>
             <a:pPr marL="0" indent="0">
@@ -4838,6 +4802,18 @@
               <a:t>航空研究開発機構　</a:t>
             </a:r>
             <a:r>
+              <a:rPr lang="zh-TW" altLang="en-US" sz="4800" dirty="0"/>
+              <a:t>航空技術</a:t>
+            </a:r>
+            <a:r>
+              <a:rPr lang="zh-TW" altLang="en-US" sz="4800" dirty="0" smtClean="0"/>
+              <a:t>部門</a:t>
+            </a:r>
+            <a:r>
+              <a:rPr lang="ja-JP" altLang="en-US" sz="4800" dirty="0" smtClean="0"/>
+              <a:t>　</a:t>
+            </a:r>
+            <a:r>
               <a:rPr lang="ja-JP" altLang="en-US" sz="4800" dirty="0" smtClean="0"/>
               <a:t>数値</a:t>
             </a:r>
@@ -4877,7 +4853,7 @@
         <p:spPr bwMode="auto">
           <a:xfrm>
             <a:off x="2322563" y="7218686"/>
-            <a:ext cx="24482720" cy="4032448"/>
+            <a:ext cx="24482720" cy="3960440"/>
           </a:xfrm>
           <a:prstGeom prst="roundRect">
             <a:avLst>
@@ -5212,8 +5188,8 @@
               <a:buNone/>
             </a:pPr>
             <a:r>
-              <a:rPr lang="ja-JP" altLang="en-US" sz="3900" dirty="0" smtClean="0"/>
-              <a:t>    我々は、数値流体力学のシミュレーション開発において、ソースコードを書くために、モデルの数式を分解して冗長な表現に変換せざるをえないことが、開発と高速化の妨げになっていると考えている。</a:t>
+              <a:rPr lang="ja-JP" altLang="en-US" sz="3600" dirty="0" smtClean="0"/>
+              <a:t>    我々は、数値流体力学のシミュレーション開発において、ソースコードを書くために、モデルの数式を初等的で冗長な数式に変換せざるをえないことが、開発と高速化の妨げになっていると考えている。</a:t>
             </a:r>
           </a:p>
           <a:p>
@@ -5222,38 +5198,38 @@
               <a:buNone/>
             </a:pPr>
             <a:r>
-              <a:rPr lang="ja-JP" altLang="en-US" sz="3900" dirty="0" smtClean="0"/>
-              <a:t>     そこで、この妨げを減らすために、領域特化言語を設計して</a:t>
-            </a:r>
-            <a:r>
-              <a:rPr lang="en-US" altLang="ja-JP" sz="3900" dirty="0" smtClean="0"/>
+              <a:rPr lang="ja-JP" altLang="en-US" sz="3600" dirty="0" smtClean="0"/>
+              <a:t>     そこで、モデル数式をそのままソースコードとするために、領域特化言語を設計して</a:t>
+            </a:r>
+            <a:r>
+              <a:rPr lang="en-US" altLang="ja-JP" sz="3600" dirty="0" smtClean="0"/>
               <a:t>C++</a:t>
             </a:r>
             <a:r>
-              <a:rPr lang="ja-JP" altLang="en-US" sz="3900" dirty="0" smtClean="0"/>
-              <a:t>に埋め込んでいる。我々の領域特化言語は、有限体積法の数式をハードウェアに近い低レベルのコードに変換して</a:t>
-            </a:r>
-            <a:r>
-              <a:rPr lang="en-US" altLang="ja-JP" sz="3900" dirty="0" smtClean="0"/>
+              <a:rPr lang="ja-JP" altLang="en-US" sz="3600" dirty="0" smtClean="0"/>
+              <a:t>に埋め込んでいる。我々の領域特化言語は、流体現象のモデリング手法である有限体積法に特化しており、そのコンパイラは有限体積法の意味において、ソースコードをハードウェアに近い低レベルのコードに変換して</a:t>
+            </a:r>
+            <a:r>
+              <a:rPr lang="en-US" altLang="ja-JP" sz="3600" dirty="0" smtClean="0"/>
               <a:t>C++</a:t>
             </a:r>
             <a:r>
-              <a:rPr lang="ja-JP" altLang="en-US" sz="3900" dirty="0" smtClean="0"/>
-              <a:t>コンパイラに渡すので、開発者は、シミュレーションモデルの数式を直接的にソースコードにすることができる。今回は、流体力学の重要現象である拡散と対流のうち、拡散現象を扱えるように、試作版</a:t>
-            </a:r>
-            <a:r>
-              <a:rPr lang="en-US" altLang="ja-JP" sz="3900" baseline="30000" dirty="0" smtClean="0"/>
+              <a:rPr lang="ja-JP" altLang="en-US" sz="3600" dirty="0" smtClean="0"/>
+              <a:t>コンパイラに渡す。今回は、流体力学の重要現象である拡散と対流のうち、拡散現象を扱えるように、試作版</a:t>
+            </a:r>
+            <a:r>
+              <a:rPr lang="en-US" altLang="ja-JP" sz="3600" baseline="30000" dirty="0" smtClean="0"/>
               <a:t>2</a:t>
             </a:r>
             <a:r>
-              <a:rPr lang="en-US" altLang="ja-JP" sz="3900" dirty="0" smtClean="0"/>
+              <a:rPr lang="en-US" altLang="ja-JP" sz="3600" dirty="0" smtClean="0"/>
               <a:t> </a:t>
             </a:r>
             <a:r>
-              <a:rPr lang="ja-JP" altLang="en-US" sz="3900" dirty="0" smtClean="0"/>
+              <a:rPr lang="ja-JP" altLang="en-US" sz="3600" dirty="0" smtClean="0"/>
               <a:t>を作成した。</a:t>
             </a:r>
-            <a:endParaRPr lang="en-US" altLang="ja-JP" sz="4000" dirty="0"/>
+            <a:endParaRPr lang="en-US" altLang="ja-JP" sz="3600" dirty="0"/>
           </a:p>
         </p:txBody>
       </p:sp>
@@ -5265,7 +5241,7 @@
         </p:nvSpPr>
         <p:spPr>
           <a:xfrm>
-            <a:off x="2180283" y="11971214"/>
+            <a:off x="2180283" y="11683182"/>
             <a:ext cx="10657184" cy="830603"/>
           </a:xfrm>
           <a:prstGeom prst="roundRect">
@@ -5321,7 +5297,7 @@
                   <a:schemeClr val="tx1"/>
                 </a:solidFill>
               </a:rPr>
-              <a:t>: </a:t>
+              <a:t>:</a:t>
             </a:r>
             <a:r>
               <a:rPr lang="ja-JP" altLang="en-US" sz="4400" b="1" dirty="0">
@@ -5329,7 +5305,7 @@
                   <a:schemeClr val="tx1"/>
                 </a:solidFill>
               </a:rPr>
-              <a:t>数式</a:t>
+              <a:t> </a:t>
             </a:r>
             <a:r>
               <a:rPr lang="ja-JP" altLang="en-US" sz="4400" b="1" dirty="0" smtClean="0">
@@ -5337,7 +5313,7 @@
                   <a:schemeClr val="tx1"/>
                 </a:solidFill>
               </a:rPr>
-              <a:t>変換としてのプログラミング</a:t>
+              <a:t>科学シミュレーションのアプリ開発</a:t>
             </a:r>
             <a:endParaRPr kumimoji="1" lang="ja-JP" altLang="en-US" sz="4400" b="1" dirty="0">
               <a:solidFill>
@@ -5355,7 +5331,7 @@
         </p:nvSpPr>
         <p:spPr>
           <a:xfrm>
-            <a:off x="2332683" y="24678115"/>
+            <a:off x="2332683" y="25614219"/>
             <a:ext cx="10657184" cy="830603"/>
           </a:xfrm>
           <a:prstGeom prst="roundRect">
@@ -5425,8 +5401,8 @@
         </p:nvSpPr>
         <p:spPr>
           <a:xfrm>
-            <a:off x="974447" y="25508718"/>
-            <a:ext cx="13373656" cy="4032448"/>
+            <a:off x="974447" y="26453533"/>
+            <a:ext cx="13373656" cy="3591689"/>
           </a:xfrm>
         </p:spPr>
         <p:txBody>
@@ -5436,67 +5412,63 @@
           <a:lstStyle/>
           <a:p>
             <a:r>
-              <a:rPr lang="ja-JP" altLang="en-US" dirty="0" smtClean="0"/>
+              <a:rPr lang="ja-JP" altLang="en-US" sz="3600" dirty="0" smtClean="0"/>
               <a:t>埋め込み型 </a:t>
             </a:r>
             <a:r>
-              <a:rPr lang="en-US" altLang="ja-JP" dirty="0" smtClean="0"/>
+              <a:rPr lang="en-US" altLang="ja-JP" sz="3600" dirty="0" smtClean="0"/>
               <a:t>DSL :  </a:t>
             </a:r>
             <a:r>
-              <a:rPr lang="ja-JP" altLang="en-US" dirty="0" smtClean="0"/>
+              <a:rPr lang="ja-JP" altLang="en-US" sz="3600" dirty="0" smtClean="0"/>
               <a:t>ホスト言語は </a:t>
             </a:r>
             <a:r>
-              <a:rPr lang="en-US" altLang="ja-JP" dirty="0" smtClean="0"/>
+              <a:rPr lang="en-US" altLang="ja-JP" sz="3600" dirty="0" smtClean="0"/>
               <a:t>C++</a:t>
             </a:r>
           </a:p>
           <a:p>
             <a:pPr lvl="1"/>
             <a:r>
-              <a:rPr lang="en-US" altLang="ja-JP" dirty="0" smtClean="0"/>
+              <a:rPr lang="en-US" altLang="ja-JP" sz="3200" dirty="0" smtClean="0"/>
               <a:t>C++ </a:t>
             </a:r>
             <a:r>
-              <a:rPr lang="ja-JP" altLang="en-US" dirty="0" smtClean="0"/>
+              <a:rPr lang="ja-JP" altLang="en-US" sz="3200" dirty="0" smtClean="0"/>
               <a:t>クラスライブラリと同じようにコンパイルできる。</a:t>
             </a:r>
-            <a:endParaRPr lang="en-US" altLang="ja-JP" dirty="0" smtClean="0"/>
-          </a:p>
-          <a:p>
-            <a:r>
-              <a:rPr lang="ja-JP" altLang="en-US" dirty="0" smtClean="0"/>
+            <a:endParaRPr lang="en-US" altLang="ja-JP" sz="3200" dirty="0" smtClean="0"/>
+          </a:p>
+          <a:p>
+            <a:r>
+              <a:rPr lang="ja-JP" altLang="en-US" sz="3600" dirty="0" smtClean="0"/>
               <a:t>数式テンプレート変換による</a:t>
             </a:r>
             <a:r>
-              <a:rPr lang="en-US" altLang="ja-JP" dirty="0" smtClean="0"/>
+              <a:rPr lang="en-US" altLang="ja-JP" sz="3600" dirty="0" smtClean="0"/>
               <a:t>DSL</a:t>
             </a:r>
           </a:p>
           <a:p>
             <a:pPr lvl="1"/>
             <a:r>
-              <a:rPr lang="ja-JP" altLang="en-US" dirty="0" smtClean="0"/>
-              <a:t>有限体積法の</a:t>
-            </a:r>
-            <a:r>
-              <a:rPr lang="ja-JP" altLang="en-US" dirty="0" smtClean="0"/>
-              <a:t>意味論モデルで数式評価</a:t>
-            </a:r>
-            <a:endParaRPr lang="en-US" altLang="ja-JP" dirty="0" smtClean="0"/>
+              <a:rPr lang="ja-JP" altLang="en-US" sz="3200" dirty="0" smtClean="0"/>
+              <a:t>有限体積法の意味論モデルで数式評価</a:t>
+            </a:r>
+            <a:endParaRPr lang="en-US" altLang="ja-JP" sz="3200" dirty="0" smtClean="0"/>
           </a:p>
           <a:p>
             <a:pPr lvl="1"/>
             <a:r>
-              <a:rPr kumimoji="1" lang="en-US" altLang="ja-JP" dirty="0" err="1" smtClean="0"/>
+              <a:rPr kumimoji="1" lang="en-US" altLang="ja-JP" sz="3200" dirty="0" err="1" smtClean="0"/>
               <a:t>Boost.Proto</a:t>
             </a:r>
             <a:r>
-              <a:rPr kumimoji="1" lang="ja-JP" altLang="en-US" dirty="0" smtClean="0"/>
+              <a:rPr kumimoji="1" lang="ja-JP" altLang="en-US" sz="3200" dirty="0" smtClean="0"/>
               <a:t>ライブラリによる実装</a:t>
             </a:r>
-            <a:endParaRPr kumimoji="1" lang="en-US" altLang="ja-JP" dirty="0" smtClean="0"/>
+            <a:endParaRPr kumimoji="1" lang="en-US" altLang="ja-JP" sz="3200" dirty="0" smtClean="0"/>
           </a:p>
         </p:txBody>
       </p:sp>
@@ -5508,7 +5480,7 @@
         </p:nvSpPr>
         <p:spPr>
           <a:xfrm>
-            <a:off x="16076641" y="22124342"/>
+            <a:off x="15716051" y="13804907"/>
             <a:ext cx="10657184" cy="830603"/>
           </a:xfrm>
           <a:prstGeom prst="roundRect">
@@ -5560,58 +5532,13 @@
       </p:sp>
       <p:sp>
         <p:nvSpPr>
-          <p:cNvPr id="21" name="コンテンツ プレースホルダー 4"/>
-          <p:cNvSpPr>
-            <a:spLocks noGrp="1"/>
-          </p:cNvSpPr>
-          <p:nvPr>
-            <p:ph sz="half" idx="1"/>
-          </p:nvPr>
-        </p:nvSpPr>
-        <p:spPr>
-          <a:xfrm>
-            <a:off x="15428019" y="22991760"/>
-            <a:ext cx="8208912" cy="993425"/>
-          </a:xfrm>
-        </p:spPr>
-        <p:txBody>
-          <a:bodyPr>
-            <a:normAutofit lnSpcReduction="10000"/>
-          </a:bodyPr>
-          <a:lstStyle/>
-          <a:p>
-            <a:pPr marL="0" indent="0">
-              <a:buNone/>
-            </a:pPr>
-            <a:r>
-              <a:rPr lang="ja-JP" altLang="en-US" dirty="0"/>
-              <a:t>微分</a:t>
-            </a:r>
-            <a:r>
-              <a:rPr lang="ja-JP" altLang="en-US" dirty="0" smtClean="0"/>
-              <a:t>方程式</a:t>
-            </a:r>
-            <a:r>
-              <a:rPr lang="ja-JP" altLang="en-US" dirty="0"/>
-              <a:t>を</a:t>
-            </a:r>
-            <a:r>
-              <a:rPr lang="ja-JP" altLang="en-US" dirty="0" smtClean="0"/>
-              <a:t>離散化するコード</a:t>
-            </a:r>
-            <a:endParaRPr kumimoji="1" lang="en-US" altLang="ja-JP" dirty="0" smtClean="0"/>
-          </a:p>
-        </p:txBody>
-      </p:sp>
-      <p:sp>
-        <p:nvSpPr>
           <p:cNvPr id="22" name="角丸四角形 21"/>
           <p:cNvSpPr/>
           <p:nvPr/>
         </p:nvSpPr>
         <p:spPr>
           <a:xfrm>
-            <a:off x="16220107" y="34759235"/>
+            <a:off x="16220107" y="35551323"/>
             <a:ext cx="10657184" cy="830603"/>
           </a:xfrm>
           <a:prstGeom prst="roundRect">
@@ -5673,8 +5600,8 @@
         </p:nvSpPr>
         <p:spPr>
           <a:xfrm>
-            <a:off x="15300450" y="35589838"/>
-            <a:ext cx="13373656" cy="4464496"/>
+            <a:off x="15300450" y="36309918"/>
+            <a:ext cx="13373656" cy="3312368"/>
           </a:xfrm>
         </p:spPr>
         <p:txBody>
@@ -5687,30 +5614,30 @@
               <a:buNone/>
             </a:pPr>
             <a:r>
-              <a:rPr lang="ja-JP" altLang="en-US" dirty="0" smtClean="0"/>
+              <a:rPr lang="ja-JP" altLang="en-US" sz="3600" dirty="0" smtClean="0"/>
               <a:t>「有限体積法</a:t>
             </a:r>
             <a:r>
-              <a:rPr lang="ja-JP" altLang="en-US" dirty="0"/>
+              <a:rPr lang="ja-JP" altLang="en-US" sz="3600" dirty="0"/>
               <a:t>テンプレート</a:t>
             </a:r>
             <a:r>
-              <a:rPr lang="en-US" altLang="ja-JP" dirty="0" smtClean="0"/>
+              <a:rPr lang="en-US" altLang="ja-JP" sz="3600" dirty="0" smtClean="0"/>
               <a:t> </a:t>
             </a:r>
             <a:r>
-              <a:rPr lang="ja-JP" altLang="en-US" dirty="0" smtClean="0"/>
+              <a:rPr lang="ja-JP" altLang="en-US" sz="3600" dirty="0" smtClean="0"/>
               <a:t>」を開発中</a:t>
             </a:r>
-            <a:endParaRPr kumimoji="1" lang="en-US" altLang="ja-JP" dirty="0" smtClean="0"/>
-          </a:p>
-          <a:p>
-            <a:r>
-              <a:rPr lang="en-US" altLang="ja-JP" dirty="0" smtClean="0"/>
+            <a:endParaRPr kumimoji="1" lang="en-US" altLang="ja-JP" sz="3600" dirty="0" smtClean="0"/>
+          </a:p>
+          <a:p>
+            <a:r>
+              <a:rPr lang="en-US" altLang="ja-JP" sz="3200" dirty="0" smtClean="0"/>
               <a:t>C++ </a:t>
             </a:r>
             <a:r>
-              <a:rPr lang="ja-JP" altLang="en-US" dirty="0" smtClean="0">
+              <a:rPr lang="ja-JP" altLang="en-US" sz="3200" dirty="0" smtClean="0">
                 <a:solidFill>
                   <a:srgbClr val="0070C0"/>
                 </a:solidFill>
@@ -5718,31 +5645,30 @@
               <a:t>数式テンプレート</a:t>
             </a:r>
             <a:r>
-              <a:rPr lang="ja-JP" altLang="en-US" dirty="0" smtClean="0"/>
+              <a:rPr lang="ja-JP" altLang="en-US" sz="3200" dirty="0" smtClean="0"/>
               <a:t>ライブラリとしての</a:t>
             </a:r>
             <a:r>
-              <a:rPr lang="en-US" altLang="ja-JP" dirty="0" smtClean="0"/>
+              <a:rPr lang="en-US" altLang="ja-JP" sz="3200" dirty="0" smtClean="0"/>
               <a:t>DSL</a:t>
             </a:r>
-            <a:endParaRPr lang="en-US" altLang="ja-JP" dirty="0" smtClean="0"/>
           </a:p>
           <a:p>
             <a:pPr lvl="1"/>
             <a:r>
-              <a:rPr lang="ja-JP" altLang="en-US" dirty="0" smtClean="0"/>
+              <a:rPr lang="ja-JP" altLang="en-US" sz="3200" dirty="0" smtClean="0"/>
               <a:t>行列演算での速度低下を回避</a:t>
             </a:r>
-            <a:endParaRPr lang="en-US" altLang="ja-JP" dirty="0"/>
+            <a:endParaRPr lang="en-US" altLang="ja-JP" sz="3200" dirty="0"/>
           </a:p>
           <a:p>
             <a:pPr lvl="1"/>
             <a:r>
-              <a:rPr lang="ja-JP" altLang="en-US" dirty="0" smtClean="0"/>
+              <a:rPr lang="ja-JP" altLang="en-US" sz="3200" dirty="0" smtClean="0"/>
               <a:t>モデル数式を</a:t>
             </a:r>
             <a:r>
-              <a:rPr lang="ja-JP" altLang="en-US" dirty="0" smtClean="0">
+              <a:rPr lang="ja-JP" altLang="en-US" sz="3200" dirty="0" smtClean="0">
                 <a:solidFill>
                   <a:srgbClr val="FF0000"/>
                 </a:solidFill>
@@ -5750,10 +5676,10 @@
               <a:t>低レベルのコードに変換</a:t>
             </a:r>
             <a:r>
-              <a:rPr lang="ja-JP" altLang="en-US" dirty="0" smtClean="0"/>
+              <a:rPr lang="ja-JP" altLang="en-US" sz="3200" dirty="0" smtClean="0"/>
               <a:t>する必要がなくなる。</a:t>
             </a:r>
-            <a:endParaRPr lang="en-US" altLang="ja-JP" dirty="0" smtClean="0"/>
+            <a:endParaRPr lang="en-US" altLang="ja-JP" sz="3200" dirty="0" smtClean="0"/>
           </a:p>
           <a:p>
             <a:pPr marL="536575" lvl="1" indent="-536575">
@@ -5761,14 +5687,10 @@
               <a:buChar char="•"/>
             </a:pPr>
             <a:r>
-              <a:rPr lang="ja-JP" altLang="en-US" dirty="0" smtClean="0"/>
-              <a:t>拡散だけでなく流体現象を扱えるように機能</a:t>
-            </a:r>
-            <a:r>
-              <a:rPr lang="ja-JP" altLang="en-US" dirty="0" smtClean="0"/>
-              <a:t>拡張中</a:t>
-            </a:r>
-            <a:endParaRPr lang="en-US" altLang="ja-JP" dirty="0" smtClean="0"/>
+              <a:rPr lang="ja-JP" altLang="en-US" sz="3200" dirty="0" smtClean="0"/>
+              <a:t>拡散だけでなく流体現象を扱えるように機能拡張中</a:t>
+            </a:r>
+            <a:endParaRPr lang="en-US" altLang="ja-JP" sz="3200" dirty="0" smtClean="0"/>
           </a:p>
         </p:txBody>
       </p:sp>
@@ -6067,8 +5989,8 @@
         </p:nvSpPr>
         <p:spPr bwMode="blackGray">
           <a:xfrm>
-            <a:off x="15647609" y="23924542"/>
-            <a:ext cx="7180104" cy="10513168"/>
+            <a:off x="15804229" y="25586243"/>
+            <a:ext cx="7180104" cy="3306851"/>
           </a:xfrm>
           <a:prstGeom prst="rect">
             <a:avLst/>
@@ -6091,303 +6013,6 @@
           <a:bodyPr anchor="ctr"/>
           <a:lstStyle/>
           <a:p>
-            <a:pPr marL="0" marR="0" lvl="0" indent="0" defTabSz="914400" eaLnBrk="1" fontAlgn="base" latinLnBrk="0" hangingPunct="1">
-              <a:lnSpc>
-                <a:spcPct val="100000"/>
-              </a:lnSpc>
-              <a:spcBef>
-                <a:spcPct val="0"/>
-              </a:spcBef>
-              <a:spcAft>
-                <a:spcPct val="0"/>
-              </a:spcAft>
-              <a:buClrTx/>
-              <a:buSzTx/>
-              <a:buFontTx/>
-              <a:buNone/>
-              <a:tabLst/>
-              <a:defRPr/>
-            </a:pPr>
-            <a:r>
-              <a:rPr kumimoji="0" lang="en-US" altLang="ja-JP" sz="2800" b="0" i="0" u="none" strike="noStrike" kern="0" cap="none" spc="0" normalizeH="0" baseline="0" noProof="0" dirty="0">
-                <a:ln>
-                  <a:noFill/>
-                </a:ln>
-                <a:solidFill>
-                  <a:srgbClr val="000000"/>
-                </a:solidFill>
-                <a:effectLst/>
-                <a:uLnTx/>
-                <a:uFillTx/>
-                <a:latin typeface="Courier New" panose="02070309020205020404" pitchFamily="49" charset="0"/>
-                <a:cs typeface="Courier New" panose="02070309020205020404" pitchFamily="49" charset="0"/>
-              </a:rPr>
-              <a:t>FVM::Grid grid( N, L);</a:t>
-            </a:r>
-            <a:br>
-              <a:rPr kumimoji="0" lang="en-US" altLang="ja-JP" sz="2800" b="0" i="0" u="none" strike="noStrike" kern="0" cap="none" spc="0" normalizeH="0" baseline="0" noProof="0" dirty="0">
-                <a:ln>
-                  <a:noFill/>
-                </a:ln>
-                <a:solidFill>
-                  <a:srgbClr val="000000"/>
-                </a:solidFill>
-                <a:effectLst/>
-                <a:uLnTx/>
-                <a:uFillTx/>
-                <a:latin typeface="Courier New" panose="02070309020205020404" pitchFamily="49" charset="0"/>
-                <a:cs typeface="Courier New" panose="02070309020205020404" pitchFamily="49" charset="0"/>
-              </a:rPr>
-            </a:br>
-            <a:r>
-              <a:rPr kumimoji="0" lang="en-US" altLang="ja-JP" sz="2800" b="0" i="0" u="none" strike="noStrike" kern="0" cap="none" spc="0" normalizeH="0" baseline="0" noProof="0" dirty="0" err="1">
-                <a:ln>
-                  <a:noFill/>
-                </a:ln>
-                <a:solidFill>
-                  <a:srgbClr val="000000"/>
-                </a:solidFill>
-                <a:effectLst/>
-                <a:uLnTx/>
-                <a:uFillTx/>
-                <a:latin typeface="Courier New" panose="02070309020205020404" pitchFamily="49" charset="0"/>
-                <a:cs typeface="Courier New" panose="02070309020205020404" pitchFamily="49" charset="0"/>
-              </a:rPr>
-              <a:t>grid.addDirichletBoundary</a:t>
-            </a:r>
-            <a:r>
-              <a:rPr kumimoji="0" lang="en-US" altLang="ja-JP" sz="2800" b="0" i="0" u="none" strike="noStrike" kern="0" cap="none" spc="0" normalizeH="0" baseline="0" noProof="0" dirty="0">
-                <a:ln>
-                  <a:noFill/>
-                </a:ln>
-                <a:solidFill>
-                  <a:srgbClr val="000000"/>
-                </a:solidFill>
-                <a:effectLst/>
-                <a:uLnTx/>
-                <a:uFillTx/>
-                <a:latin typeface="Courier New" panose="02070309020205020404" pitchFamily="49" charset="0"/>
-                <a:cs typeface="Courier New" panose="02070309020205020404" pitchFamily="49" charset="0"/>
-              </a:rPr>
-              <a:t>(</a:t>
-            </a:r>
-            <a:br>
-              <a:rPr kumimoji="0" lang="en-US" altLang="ja-JP" sz="2800" b="0" i="0" u="none" strike="noStrike" kern="0" cap="none" spc="0" normalizeH="0" baseline="0" noProof="0" dirty="0">
-                <a:ln>
-                  <a:noFill/>
-                </a:ln>
-                <a:solidFill>
-                  <a:srgbClr val="000000"/>
-                </a:solidFill>
-                <a:effectLst/>
-                <a:uLnTx/>
-                <a:uFillTx/>
-                <a:latin typeface="Courier New" panose="02070309020205020404" pitchFamily="49" charset="0"/>
-                <a:cs typeface="Courier New" panose="02070309020205020404" pitchFamily="49" charset="0"/>
-              </a:rPr>
-            </a:br>
-            <a:r>
-              <a:rPr kumimoji="0" lang="en-US" altLang="ja-JP" sz="2800" b="0" i="0" u="none" strike="noStrike" kern="0" cap="none" spc="0" normalizeH="0" baseline="0" noProof="0" dirty="0">
-                <a:ln>
-                  <a:noFill/>
-                </a:ln>
-                <a:solidFill>
-                  <a:srgbClr val="000000"/>
-                </a:solidFill>
-                <a:effectLst/>
-                <a:uLnTx/>
-                <a:uFillTx/>
-                <a:latin typeface="Courier New" panose="02070309020205020404" pitchFamily="49" charset="0"/>
-                <a:cs typeface="Courier New" panose="02070309020205020404" pitchFamily="49" charset="0"/>
-              </a:rPr>
-              <a:t>    </a:t>
-            </a:r>
-            <a:r>
-              <a:rPr kumimoji="0" lang="ja-JP" altLang="en-US" sz="2800" b="0" i="0" u="none" strike="noStrike" kern="0" cap="none" spc="0" normalizeH="0" baseline="0" noProof="0" dirty="0">
-                <a:ln>
-                  <a:noFill/>
-                </a:ln>
-                <a:solidFill>
-                  <a:srgbClr val="000000"/>
-                </a:solidFill>
-                <a:effectLst/>
-                <a:uLnTx/>
-                <a:uFillTx/>
-                <a:latin typeface="Courier New" panose="02070309020205020404" pitchFamily="49" charset="0"/>
-                <a:cs typeface="Courier New" panose="02070309020205020404" pitchFamily="49" charset="0"/>
-              </a:rPr>
-              <a:t>　　　　　　　　　　　</a:t>
-            </a:r>
-            <a:r>
-              <a:rPr kumimoji="0" lang="en-US" altLang="ja-JP" sz="2800" b="0" i="0" u="none" strike="noStrike" kern="0" cap="none" spc="0" normalizeH="0" baseline="0" noProof="0" dirty="0">
-                <a:ln>
-                  <a:noFill/>
-                </a:ln>
-                <a:solidFill>
-                  <a:srgbClr val="000000"/>
-                </a:solidFill>
-                <a:effectLst/>
-                <a:uLnTx/>
-                <a:uFillTx/>
-                <a:latin typeface="Courier New" panose="02070309020205020404" pitchFamily="49" charset="0"/>
-                <a:cs typeface="Courier New" panose="02070309020205020404" pitchFamily="49" charset="0"/>
-              </a:rPr>
-              <a:t>-1, 0, TB);</a:t>
-            </a:r>
-            <a:br>
-              <a:rPr kumimoji="0" lang="en-US" altLang="ja-JP" sz="2800" b="0" i="0" u="none" strike="noStrike" kern="0" cap="none" spc="0" normalizeH="0" baseline="0" noProof="0" dirty="0">
-                <a:ln>
-                  <a:noFill/>
-                </a:ln>
-                <a:solidFill>
-                  <a:srgbClr val="000000"/>
-                </a:solidFill>
-                <a:effectLst/>
-                <a:uLnTx/>
-                <a:uFillTx/>
-                <a:latin typeface="Courier New" panose="02070309020205020404" pitchFamily="49" charset="0"/>
-                <a:cs typeface="Courier New" panose="02070309020205020404" pitchFamily="49" charset="0"/>
-              </a:rPr>
-            </a:br>
-            <a:r>
-              <a:rPr kumimoji="0" lang="en-US" altLang="ja-JP" sz="2800" b="0" i="0" u="none" strike="noStrike" kern="0" cap="none" spc="0" normalizeH="0" baseline="0" noProof="0" dirty="0" err="1">
-                <a:ln>
-                  <a:noFill/>
-                </a:ln>
-                <a:solidFill>
-                  <a:srgbClr val="000000"/>
-                </a:solidFill>
-                <a:effectLst/>
-                <a:uLnTx/>
-                <a:uFillTx/>
-                <a:latin typeface="Courier New" panose="02070309020205020404" pitchFamily="49" charset="0"/>
-                <a:cs typeface="Courier New" panose="02070309020205020404" pitchFamily="49" charset="0"/>
-              </a:rPr>
-              <a:t>grid.addNeumannBoundary</a:t>
-            </a:r>
-            <a:r>
-              <a:rPr kumimoji="0" lang="en-US" altLang="ja-JP" sz="2800" b="0" i="0" u="none" strike="noStrike" kern="0" cap="none" spc="0" normalizeH="0" baseline="0" noProof="0" dirty="0">
-                <a:ln>
-                  <a:noFill/>
-                </a:ln>
-                <a:solidFill>
-                  <a:srgbClr val="000000"/>
-                </a:solidFill>
-                <a:effectLst/>
-                <a:uLnTx/>
-                <a:uFillTx/>
-                <a:latin typeface="Courier New" panose="02070309020205020404" pitchFamily="49" charset="0"/>
-                <a:cs typeface="Courier New" panose="02070309020205020404" pitchFamily="49" charset="0"/>
-              </a:rPr>
-              <a:t>(</a:t>
-            </a:r>
-            <a:br>
-              <a:rPr kumimoji="0" lang="en-US" altLang="ja-JP" sz="2800" b="0" i="0" u="none" strike="noStrike" kern="0" cap="none" spc="0" normalizeH="0" baseline="0" noProof="0" dirty="0">
-                <a:ln>
-                  <a:noFill/>
-                </a:ln>
-                <a:solidFill>
-                  <a:srgbClr val="000000"/>
-                </a:solidFill>
-                <a:effectLst/>
-                <a:uLnTx/>
-                <a:uFillTx/>
-                <a:latin typeface="Courier New" panose="02070309020205020404" pitchFamily="49" charset="0"/>
-                <a:cs typeface="Courier New" panose="02070309020205020404" pitchFamily="49" charset="0"/>
-              </a:rPr>
-            </a:br>
-            <a:r>
-              <a:rPr kumimoji="0" lang="en-US" altLang="ja-JP" sz="2800" b="0" i="0" u="none" strike="noStrike" kern="0" cap="none" spc="0" normalizeH="0" baseline="0" noProof="0" dirty="0">
-                <a:ln>
-                  <a:noFill/>
-                </a:ln>
-                <a:solidFill>
-                  <a:srgbClr val="000000"/>
-                </a:solidFill>
-                <a:effectLst/>
-                <a:uLnTx/>
-                <a:uFillTx/>
-                <a:latin typeface="Courier New" panose="02070309020205020404" pitchFamily="49" charset="0"/>
-                <a:cs typeface="Courier New" panose="02070309020205020404" pitchFamily="49" charset="0"/>
-              </a:rPr>
-              <a:t>     </a:t>
-            </a:r>
-            <a:r>
-              <a:rPr kumimoji="0" lang="ja-JP" altLang="en-US" sz="2800" b="0" i="0" u="none" strike="noStrike" kern="0" cap="none" spc="0" normalizeH="0" baseline="0" noProof="0" dirty="0">
-                <a:ln>
-                  <a:noFill/>
-                </a:ln>
-                <a:solidFill>
-                  <a:srgbClr val="000000"/>
-                </a:solidFill>
-                <a:effectLst/>
-                <a:uLnTx/>
-                <a:uFillTx/>
-                <a:latin typeface="Courier New" panose="02070309020205020404" pitchFamily="49" charset="0"/>
-                <a:cs typeface="Courier New" panose="02070309020205020404" pitchFamily="49" charset="0"/>
-              </a:rPr>
-              <a:t>　　　　　　　　　　</a:t>
-            </a:r>
-            <a:r>
-              <a:rPr kumimoji="0" lang="en-US" altLang="ja-JP" sz="2800" b="0" i="0" u="none" strike="noStrike" kern="0" cap="none" spc="0" normalizeH="0" baseline="0" noProof="0" dirty="0">
-                <a:ln>
-                  <a:noFill/>
-                </a:ln>
-                <a:solidFill>
-                  <a:srgbClr val="000000"/>
-                </a:solidFill>
-                <a:effectLst/>
-                <a:uLnTx/>
-                <a:uFillTx/>
-                <a:latin typeface="Courier New" panose="02070309020205020404" pitchFamily="49" charset="0"/>
-                <a:cs typeface="Courier New" panose="02070309020205020404" pitchFamily="49" charset="0"/>
-              </a:rPr>
-              <a:t>N, N-1, 0.0</a:t>
-            </a:r>
-            <a:r>
-              <a:rPr kumimoji="0" lang="en-US" altLang="ja-JP" sz="2800" b="0" i="0" u="none" strike="noStrike" kern="0" cap="none" spc="0" normalizeH="0" baseline="0" noProof="0" dirty="0" smtClean="0">
-                <a:ln>
-                  <a:noFill/>
-                </a:ln>
-                <a:solidFill>
-                  <a:srgbClr val="000000"/>
-                </a:solidFill>
-                <a:effectLst/>
-                <a:uLnTx/>
-                <a:uFillTx/>
-                <a:latin typeface="Courier New" panose="02070309020205020404" pitchFamily="49" charset="0"/>
-                <a:cs typeface="Courier New" panose="02070309020205020404" pitchFamily="49" charset="0"/>
-              </a:rPr>
-              <a:t>);</a:t>
-            </a:r>
-          </a:p>
-          <a:p>
-            <a:pPr marL="0" marR="0" lvl="0" indent="0" defTabSz="914400" eaLnBrk="1" fontAlgn="base" latinLnBrk="0" hangingPunct="1">
-              <a:lnSpc>
-                <a:spcPct val="100000"/>
-              </a:lnSpc>
-              <a:spcBef>
-                <a:spcPct val="0"/>
-              </a:spcBef>
-              <a:spcAft>
-                <a:spcPct val="0"/>
-              </a:spcAft>
-              <a:buClrTx/>
-              <a:buSzTx/>
-              <a:buFontTx/>
-              <a:buNone/>
-              <a:tabLst/>
-              <a:defRPr/>
-            </a:pPr>
-            <a:endParaRPr kumimoji="0" lang="en-US" altLang="ja-JP" sz="2800" kern="0" dirty="0">
-              <a:solidFill>
-                <a:srgbClr val="000000"/>
-              </a:solidFill>
-              <a:latin typeface="Courier New" panose="02070309020205020404" pitchFamily="49" charset="0"/>
-              <a:cs typeface="Courier New" panose="02070309020205020404" pitchFamily="49" charset="0"/>
-            </a:endParaRPr>
-          </a:p>
-          <a:p>
             <a:pPr defTabSz="914400" fontAlgn="base">
               <a:spcBef>
                 <a:spcPct val="0"/>
@@ -6398,7 +6023,7 @@
               <a:defRPr/>
             </a:pPr>
             <a:r>
-              <a:rPr lang="en-US" altLang="ja-JP" sz="2800" dirty="0">
+              <a:rPr lang="en-US" altLang="ja-JP" sz="2800" dirty="0" smtClean="0">
                 <a:latin typeface="Courier New" panose="02070309020205020404" pitchFamily="49" charset="0"/>
                 <a:cs typeface="Courier New" panose="02070309020205020404" pitchFamily="49" charset="0"/>
               </a:rPr>
@@ -6624,256 +6249,11 @@
               </a:rPr>
               <a:t>);</a:t>
             </a:r>
-            <a:r>
-              <a:rPr lang="en-US" altLang="ja-JP" sz="2800" dirty="0">
-                <a:latin typeface="Courier New" panose="02070309020205020404" pitchFamily="49" charset="0"/>
-                <a:cs typeface="Courier New" panose="02070309020205020404" pitchFamily="49" charset="0"/>
-              </a:rPr>
-              <a:t/>
-            </a:r>
-            <a:br>
-              <a:rPr lang="en-US" altLang="ja-JP" sz="2800" dirty="0">
-                <a:latin typeface="Courier New" panose="02070309020205020404" pitchFamily="49" charset="0"/>
-                <a:cs typeface="Courier New" panose="02070309020205020404" pitchFamily="49" charset="0"/>
-              </a:rPr>
-            </a:br>
-            <a:r>
-              <a:rPr lang="en-US" altLang="ja-JP" sz="2800" dirty="0" smtClean="0">
-                <a:latin typeface="Courier New" panose="02070309020205020404" pitchFamily="49" charset="0"/>
-                <a:cs typeface="Courier New" panose="02070309020205020404" pitchFamily="49" charset="0"/>
-              </a:rPr>
-              <a:t>LA</a:t>
-            </a:r>
-            <a:r>
-              <a:rPr lang="en-US" altLang="ja-JP" sz="2800" dirty="0">
-                <a:latin typeface="Courier New" panose="02070309020205020404" pitchFamily="49" charset="0"/>
-                <a:cs typeface="Courier New" panose="02070309020205020404" pitchFamily="49" charset="0"/>
-              </a:rPr>
-              <a:t>::Vector b = </a:t>
-            </a:r>
-            <a:br>
-              <a:rPr lang="en-US" altLang="ja-JP" sz="2800" dirty="0">
-                <a:latin typeface="Courier New" panose="02070309020205020404" pitchFamily="49" charset="0"/>
-                <a:cs typeface="Courier New" panose="02070309020205020404" pitchFamily="49" charset="0"/>
-              </a:rPr>
-            </a:br>
-            <a:r>
-              <a:rPr lang="en-US" altLang="ja-JP" sz="2800" dirty="0">
-                <a:latin typeface="Courier New" panose="02070309020205020404" pitchFamily="49" charset="0"/>
-                <a:cs typeface="Courier New" panose="02070309020205020404" pitchFamily="49" charset="0"/>
-              </a:rPr>
-              <a:t>  </a:t>
-            </a:r>
-            <a:r>
-              <a:rPr lang="en-US" altLang="ja-JP" sz="2800" dirty="0" err="1">
-                <a:latin typeface="Courier New" panose="02070309020205020404" pitchFamily="49" charset="0"/>
-                <a:cs typeface="Courier New" panose="02070309020205020404" pitchFamily="49" charset="0"/>
-              </a:rPr>
-              <a:t>grid.discretizeFunction</a:t>
-            </a:r>
-            <a:r>
-              <a:rPr lang="en-US" altLang="ja-JP" sz="2800" dirty="0">
-                <a:latin typeface="Courier New" panose="02070309020205020404" pitchFamily="49" charset="0"/>
-                <a:cs typeface="Courier New" panose="02070309020205020404" pitchFamily="49" charset="0"/>
-              </a:rPr>
-              <a:t>(</a:t>
-            </a:r>
-            <a:br>
-              <a:rPr lang="en-US" altLang="ja-JP" sz="2800" dirty="0">
-                <a:latin typeface="Courier New" panose="02070309020205020404" pitchFamily="49" charset="0"/>
-                <a:cs typeface="Courier New" panose="02070309020205020404" pitchFamily="49" charset="0"/>
-              </a:rPr>
-            </a:br>
-            <a:r>
-              <a:rPr lang="en-US" altLang="ja-JP" sz="2800" dirty="0">
-                <a:latin typeface="Courier New" panose="02070309020205020404" pitchFamily="49" charset="0"/>
-                <a:cs typeface="Courier New" panose="02070309020205020404" pitchFamily="49" charset="0"/>
-              </a:rPr>
-              <a:t>          </a:t>
-            </a:r>
-            <a:r>
-              <a:rPr lang="ja-JP" altLang="en-US" sz="2800" dirty="0" smtClean="0">
-                <a:latin typeface="Courier New" panose="02070309020205020404" pitchFamily="49" charset="0"/>
-                <a:cs typeface="Courier New" panose="02070309020205020404" pitchFamily="49" charset="0"/>
-              </a:rPr>
-              <a:t>　　　　　　　　　</a:t>
-            </a:r>
-            <a:r>
-              <a:rPr lang="en-US" altLang="ja-JP" sz="2800" dirty="0" smtClean="0">
-                <a:latin typeface="Courier New" panose="02070309020205020404" pitchFamily="49" charset="0"/>
-                <a:cs typeface="Courier New" panose="02070309020205020404" pitchFamily="49" charset="0"/>
-              </a:rPr>
-              <a:t> </a:t>
-            </a:r>
-            <a:r>
-              <a:rPr lang="en-US" altLang="ja-JP" sz="2800" dirty="0">
-                <a:latin typeface="Courier New" panose="02070309020205020404" pitchFamily="49" charset="0"/>
-                <a:cs typeface="Courier New" panose="02070309020205020404" pitchFamily="49" charset="0"/>
-              </a:rPr>
-              <a:t>- s * TI </a:t>
-            </a:r>
-            <a:r>
-              <a:rPr lang="en-US" altLang="ja-JP" sz="2800" dirty="0" smtClean="0">
-                <a:latin typeface="Courier New" panose="02070309020205020404" pitchFamily="49" charset="0"/>
-                <a:cs typeface="Courier New" panose="02070309020205020404" pitchFamily="49" charset="0"/>
-              </a:rPr>
-              <a:t>);</a:t>
-            </a:r>
-          </a:p>
-          <a:p>
-            <a:pPr defTabSz="914400" fontAlgn="base">
-              <a:spcBef>
-                <a:spcPct val="0"/>
-              </a:spcBef>
-              <a:spcAft>
-                <a:spcPct val="0"/>
-              </a:spcAft>
-              <a:defRPr/>
-            </a:pPr>
-            <a:endParaRPr lang="en-US" altLang="ja-JP" sz="2800" dirty="0">
+            <a:endParaRPr lang="en-US" altLang="ja-JP" sz="2800" dirty="0" smtClean="0">
               <a:latin typeface="Courier New" panose="02070309020205020404" pitchFamily="49" charset="0"/>
               <a:cs typeface="Courier New" panose="02070309020205020404" pitchFamily="49" charset="0"/>
             </a:endParaRPr>
           </a:p>
-          <a:p>
-            <a:pPr>
-              <a:defRPr/>
-            </a:pPr>
-            <a:r>
-              <a:rPr lang="en-US" altLang="ja-JP" sz="2800" dirty="0">
-                <a:latin typeface="Courier New" panose="02070309020205020404" pitchFamily="49" charset="0"/>
-                <a:cs typeface="Courier New" panose="02070309020205020404" pitchFamily="49" charset="0"/>
-              </a:rPr>
-              <a:t>FVM::</a:t>
-            </a:r>
-            <a:r>
-              <a:rPr lang="en-US" altLang="ja-JP" sz="2800" dirty="0" err="1">
-                <a:latin typeface="Courier New" panose="02070309020205020404" pitchFamily="49" charset="0"/>
-                <a:cs typeface="Courier New" panose="02070309020205020404" pitchFamily="49" charset="0"/>
-              </a:rPr>
-              <a:t>BoundaryCorrector</a:t>
-            </a:r>
-            <a:r>
-              <a:rPr lang="en-US" altLang="ja-JP" sz="2800" dirty="0">
-                <a:latin typeface="Courier New" panose="02070309020205020404" pitchFamily="49" charset="0"/>
-                <a:cs typeface="Courier New" panose="02070309020205020404" pitchFamily="49" charset="0"/>
-              </a:rPr>
-              <a:t> </a:t>
-            </a:r>
-            <a:br>
-              <a:rPr lang="en-US" altLang="ja-JP" sz="2800" dirty="0">
-                <a:latin typeface="Courier New" panose="02070309020205020404" pitchFamily="49" charset="0"/>
-                <a:cs typeface="Courier New" panose="02070309020205020404" pitchFamily="49" charset="0"/>
-              </a:rPr>
-            </a:br>
-            <a:r>
-              <a:rPr lang="en-US" altLang="ja-JP" sz="2800" dirty="0">
-                <a:latin typeface="Courier New" panose="02070309020205020404" pitchFamily="49" charset="0"/>
-                <a:cs typeface="Courier New" panose="02070309020205020404" pitchFamily="49" charset="0"/>
-              </a:rPr>
-              <a:t>  </a:t>
-            </a:r>
-            <a:r>
-              <a:rPr lang="en-US" altLang="ja-JP" sz="2800" dirty="0" err="1">
-                <a:latin typeface="Courier New" panose="02070309020205020404" pitchFamily="49" charset="0"/>
-                <a:cs typeface="Courier New" panose="02070309020205020404" pitchFamily="49" charset="0"/>
-              </a:rPr>
-              <a:t>bCorrector</a:t>
-            </a:r>
-            <a:r>
-              <a:rPr lang="en-US" altLang="ja-JP" sz="2800" dirty="0">
-                <a:latin typeface="Courier New" panose="02070309020205020404" pitchFamily="49" charset="0"/>
-                <a:cs typeface="Courier New" panose="02070309020205020404" pitchFamily="49" charset="0"/>
-              </a:rPr>
-              <a:t>( grid, </a:t>
-            </a:r>
-            <a:r>
-              <a:rPr lang="en-US" altLang="ja-JP" sz="2800" dirty="0" err="1">
-                <a:latin typeface="Courier New" panose="02070309020205020404" pitchFamily="49" charset="0"/>
-                <a:cs typeface="Courier New" panose="02070309020205020404" pitchFamily="49" charset="0"/>
-              </a:rPr>
-              <a:t>opr</a:t>
-            </a:r>
-            <a:r>
-              <a:rPr lang="en-US" altLang="ja-JP" sz="2800" dirty="0">
-                <a:latin typeface="Courier New" panose="02070309020205020404" pitchFamily="49" charset="0"/>
-                <a:cs typeface="Courier New" panose="02070309020205020404" pitchFamily="49" charset="0"/>
-              </a:rPr>
-              <a:t>);</a:t>
-            </a:r>
-          </a:p>
-          <a:p>
-            <a:pPr>
-              <a:defRPr/>
-            </a:pPr>
-            <a:r>
-              <a:rPr lang="en-US" altLang="ja-JP" sz="2800" dirty="0">
-                <a:latin typeface="Courier New" panose="02070309020205020404" pitchFamily="49" charset="0"/>
-                <a:cs typeface="Courier New" panose="02070309020205020404" pitchFamily="49" charset="0"/>
-              </a:rPr>
-              <a:t/>
-            </a:r>
-            <a:br>
-              <a:rPr lang="en-US" altLang="ja-JP" sz="2800" dirty="0">
-                <a:latin typeface="Courier New" panose="02070309020205020404" pitchFamily="49" charset="0"/>
-                <a:cs typeface="Courier New" panose="02070309020205020404" pitchFamily="49" charset="0"/>
-              </a:rPr>
-            </a:br>
-            <a:r>
-              <a:rPr lang="en-US" altLang="ja-JP" sz="2800" dirty="0" err="1">
-                <a:latin typeface="Courier New" panose="02070309020205020404" pitchFamily="49" charset="0"/>
-                <a:cs typeface="Courier New" panose="02070309020205020404" pitchFamily="49" charset="0"/>
-              </a:rPr>
-              <a:t>bCorrector.applyTo</a:t>
-            </a:r>
-            <a:r>
-              <a:rPr lang="en-US" altLang="ja-JP" sz="2800" dirty="0">
-                <a:latin typeface="Courier New" panose="02070309020205020404" pitchFamily="49" charset="0"/>
-                <a:cs typeface="Courier New" panose="02070309020205020404" pitchFamily="49" charset="0"/>
-              </a:rPr>
-              <a:t>( C);</a:t>
-            </a:r>
-            <a:br>
-              <a:rPr lang="en-US" altLang="ja-JP" sz="2800" dirty="0">
-                <a:latin typeface="Courier New" panose="02070309020205020404" pitchFamily="49" charset="0"/>
-                <a:cs typeface="Courier New" panose="02070309020205020404" pitchFamily="49" charset="0"/>
-              </a:rPr>
-            </a:br>
-            <a:r>
-              <a:rPr lang="en-US" altLang="ja-JP" sz="2800" dirty="0" err="1">
-                <a:latin typeface="Courier New" panose="02070309020205020404" pitchFamily="49" charset="0"/>
-                <a:cs typeface="Courier New" panose="02070309020205020404" pitchFamily="49" charset="0"/>
-              </a:rPr>
-              <a:t>bCorrector.applyTo</a:t>
-            </a:r>
-            <a:r>
-              <a:rPr lang="en-US" altLang="ja-JP" sz="2800" dirty="0">
-                <a:latin typeface="Courier New" panose="02070309020205020404" pitchFamily="49" charset="0"/>
-                <a:cs typeface="Courier New" panose="02070309020205020404" pitchFamily="49" charset="0"/>
-              </a:rPr>
-              <a:t>( b</a:t>
-            </a:r>
-            <a:r>
-              <a:rPr lang="en-US" altLang="ja-JP" sz="2800" dirty="0" smtClean="0">
-                <a:latin typeface="Courier New" panose="02070309020205020404" pitchFamily="49" charset="0"/>
-                <a:cs typeface="Courier New" panose="02070309020205020404" pitchFamily="49" charset="0"/>
-              </a:rPr>
-              <a:t>);</a:t>
-            </a:r>
-            <a:endParaRPr kumimoji="0" lang="en-US" altLang="ja-JP" sz="2800" b="0" i="0" u="none" strike="noStrike" kern="0" cap="none" spc="0" normalizeH="0" baseline="0" noProof="0" dirty="0" smtClean="0">
-              <a:ln>
-                <a:noFill/>
-              </a:ln>
-              <a:solidFill>
-                <a:srgbClr val="000000"/>
-              </a:solidFill>
-              <a:effectLst/>
-              <a:uLnTx/>
-              <a:uFillTx/>
-              <a:latin typeface="Courier New" panose="02070309020205020404" pitchFamily="49" charset="0"/>
-              <a:cs typeface="Courier New" panose="02070309020205020404" pitchFamily="49" charset="0"/>
-            </a:endParaRPr>
-          </a:p>
         </p:txBody>
       </p:sp>
       <p:sp>
@@ -6884,7 +6264,7 @@
         </p:nvSpPr>
         <p:spPr>
           <a:xfrm>
-            <a:off x="6066979" y="14131455"/>
+            <a:off x="6066979" y="14563503"/>
             <a:ext cx="504056" cy="504056"/>
           </a:xfrm>
           <a:prstGeom prst="downArrow">
@@ -6930,7 +6310,7 @@
         </p:nvSpPr>
         <p:spPr>
           <a:xfrm>
-            <a:off x="4338787" y="14707520"/>
+            <a:off x="4338787" y="15139568"/>
             <a:ext cx="4392488" cy="720079"/>
           </a:xfrm>
           <a:prstGeom prst="flowChartProcess">
@@ -6967,11 +6347,6 @@
               </a:rPr>
               <a:t>離散化モデル</a:t>
             </a:r>
-            <a:endParaRPr lang="ja-JP" altLang="en-US" sz="3000" dirty="0">
-              <a:solidFill>
-                <a:schemeClr val="tx1"/>
-              </a:solidFill>
-            </a:endParaRPr>
           </a:p>
         </p:txBody>
       </p:sp>
@@ -6983,7 +6358,7 @@
         </p:nvSpPr>
         <p:spPr>
           <a:xfrm>
-            <a:off x="6750278" y="14131455"/>
+            <a:off x="6750278" y="14563503"/>
             <a:ext cx="1620957" cy="523220"/>
           </a:xfrm>
           <a:prstGeom prst="rect">
@@ -7017,7 +6392,7 @@
         </p:nvSpPr>
         <p:spPr>
           <a:xfrm>
-            <a:off x="4338787" y="16219688"/>
+            <a:off x="4338787" y="16651736"/>
             <a:ext cx="4392488" cy="720079"/>
           </a:xfrm>
           <a:prstGeom prst="flowChartProcess">
@@ -7078,7 +6453,7 @@
         </p:nvSpPr>
         <p:spPr>
           <a:xfrm>
-            <a:off x="4338787" y="17659847"/>
+            <a:off x="4338787" y="18091895"/>
             <a:ext cx="4392488" cy="720079"/>
           </a:xfrm>
           <a:prstGeom prst="flowChartProcess">
@@ -7131,7 +6506,7 @@
         </p:nvSpPr>
         <p:spPr>
           <a:xfrm>
-            <a:off x="6066979" y="15624459"/>
+            <a:off x="6066979" y="16056507"/>
             <a:ext cx="504056" cy="504056"/>
           </a:xfrm>
           <a:prstGeom prst="downArrow">
@@ -7177,7 +6552,7 @@
         </p:nvSpPr>
         <p:spPr>
           <a:xfrm>
-            <a:off x="6750278" y="15624459"/>
+            <a:off x="6750278" y="16056507"/>
             <a:ext cx="1620957" cy="523220"/>
           </a:xfrm>
           <a:prstGeom prst="rect">
@@ -7215,7 +6590,7 @@
         </p:nvSpPr>
         <p:spPr>
           <a:xfrm>
-            <a:off x="6066979" y="17064619"/>
+            <a:off x="6066979" y="17496667"/>
             <a:ext cx="504056" cy="504056"/>
           </a:xfrm>
           <a:prstGeom prst="downArrow">
@@ -7261,7 +6636,7 @@
         </p:nvSpPr>
         <p:spPr>
           <a:xfrm>
-            <a:off x="4304939" y="12979326"/>
+            <a:off x="4304939" y="13411374"/>
             <a:ext cx="4392488" cy="1044115"/>
           </a:xfrm>
           <a:prstGeom prst="flowChartProcess">
@@ -7330,7 +6705,7 @@
         </p:nvSpPr>
         <p:spPr>
           <a:xfrm>
-            <a:off x="3618707" y="12979326"/>
+            <a:off x="3618707" y="13411374"/>
             <a:ext cx="648072" cy="2448273"/>
           </a:xfrm>
           <a:prstGeom prst="leftBrace">
@@ -7378,7 +6753,7 @@
         </p:nvSpPr>
         <p:spPr>
           <a:xfrm>
-            <a:off x="3618707" y="15427599"/>
+            <a:off x="3618707" y="15859647"/>
             <a:ext cx="648072" cy="2952327"/>
           </a:xfrm>
           <a:prstGeom prst="leftBrace">
@@ -7426,7 +6801,7 @@
         </p:nvSpPr>
         <p:spPr>
           <a:xfrm>
-            <a:off x="1890515" y="13761832"/>
+            <a:off x="1890515" y="14193880"/>
             <a:ext cx="1620957" cy="523220"/>
           </a:xfrm>
           <a:prstGeom prst="rect">
@@ -7464,7 +6839,7 @@
         </p:nvSpPr>
         <p:spPr>
           <a:xfrm>
-            <a:off x="1925742" y="16651734"/>
+            <a:off x="1925742" y="17083782"/>
             <a:ext cx="1620957" cy="523220"/>
           </a:xfrm>
           <a:prstGeom prst="rect">
@@ -7510,7 +6885,7 @@
         </p:nvSpPr>
         <p:spPr>
           <a:xfrm>
-            <a:off x="8803283" y="15427599"/>
+            <a:off x="8803283" y="15859647"/>
             <a:ext cx="504056" cy="1512168"/>
           </a:xfrm>
           <a:prstGeom prst="rightBrace">
@@ -7558,7 +6933,7 @@
         </p:nvSpPr>
         <p:spPr>
           <a:xfrm>
-            <a:off x="9468723" y="15499606"/>
+            <a:off x="9468723" y="15931654"/>
             <a:ext cx="3631122" cy="1569660"/>
           </a:xfrm>
           <a:prstGeom prst="rect">
@@ -7626,7 +7001,7 @@
         </p:nvSpPr>
         <p:spPr>
           <a:xfrm>
-            <a:off x="8803283" y="14059446"/>
+            <a:off x="8803283" y="14491494"/>
             <a:ext cx="504056" cy="1368153"/>
           </a:xfrm>
           <a:prstGeom prst="rightBrace">
@@ -7674,7 +7049,7 @@
         </p:nvSpPr>
         <p:spPr>
           <a:xfrm>
-            <a:off x="9410683" y="14206364"/>
+            <a:off x="9410683" y="14638412"/>
             <a:ext cx="3538148" cy="1077218"/>
           </a:xfrm>
           <a:prstGeom prst="rect">
@@ -7730,7 +7105,7 @@
         </p:nvSpPr>
         <p:spPr>
           <a:xfrm>
-            <a:off x="6787059" y="17011774"/>
+            <a:off x="6787059" y="17443822"/>
             <a:ext cx="3352136" cy="523220"/>
           </a:xfrm>
           <a:prstGeom prst="rect">
@@ -7788,7 +7163,7 @@
         </p:nvSpPr>
         <p:spPr>
           <a:xfrm>
-            <a:off x="1026419" y="29713926"/>
+            <a:off x="1026419" y="29901206"/>
             <a:ext cx="13373656" cy="1800200"/>
           </a:xfrm>
         </p:spPr>
@@ -7802,25 +7177,25 @@
               <a:buNone/>
             </a:pPr>
             <a:r>
-              <a:rPr lang="ja-JP" altLang="en-US" b="1" dirty="0" smtClean="0"/>
+              <a:rPr lang="ja-JP" altLang="en-US" sz="3600" b="1" dirty="0" smtClean="0"/>
               <a:t>低レベルの数式変換は</a:t>
             </a:r>
             <a:r>
-              <a:rPr lang="en-US" altLang="ja-JP" b="1" dirty="0" smtClean="0"/>
+              <a:rPr lang="en-US" altLang="ja-JP" sz="3600" b="1" dirty="0" smtClean="0"/>
               <a:t>DSL</a:t>
             </a:r>
             <a:r>
-              <a:rPr lang="ja-JP" altLang="en-US" b="1" dirty="0" smtClean="0"/>
+              <a:rPr lang="ja-JP" altLang="en-US" sz="3600" b="1" dirty="0" smtClean="0"/>
               <a:t>コンパイラに</a:t>
             </a:r>
-            <a:endParaRPr lang="en-US" altLang="ja-JP" b="1" dirty="0" smtClean="0"/>
-          </a:p>
-          <a:p>
-            <a:r>
-              <a:rPr lang="ja-JP" altLang="en-US" dirty="0" smtClean="0"/>
+            <a:endParaRPr lang="en-US" altLang="ja-JP" sz="3600" b="1" dirty="0" smtClean="0"/>
+          </a:p>
+          <a:p>
+            <a:r>
+              <a:rPr lang="ja-JP" altLang="en-US" sz="3600" dirty="0" smtClean="0"/>
               <a:t>例） 有限体積法で一次元熱伝導問題を解く場合</a:t>
             </a:r>
-            <a:endParaRPr lang="en-US" altLang="ja-JP" dirty="0" smtClean="0"/>
+            <a:endParaRPr lang="en-US" altLang="ja-JP" sz="3600" dirty="0" smtClean="0"/>
           </a:p>
         </p:txBody>
       </p:sp>
@@ -8885,20 +8260,54 @@
       </p:sp>
       <p:sp>
         <p:nvSpPr>
-          <p:cNvPr id="141" name="角丸四角形 140"/>
+          <p:cNvPr id="145" name="テキスト ボックス 144"/>
+          <p:cNvSpPr txBox="1"/>
+          <p:nvPr/>
+        </p:nvSpPr>
+        <p:spPr>
+          <a:xfrm>
+            <a:off x="16426375" y="17161307"/>
+            <a:ext cx="1832553" cy="584775"/>
+          </a:xfrm>
+          <a:prstGeom prst="rect">
+            <a:avLst/>
+          </a:prstGeom>
+          <a:noFill/>
+        </p:spPr>
+        <p:txBody>
+          <a:bodyPr wrap="none" rtlCol="0">
+            <a:spAutoFit/>
+          </a:bodyPr>
+          <a:lstStyle/>
+          <a:p>
+            <a:r>
+              <a:rPr lang="ja-JP" altLang="en-US" sz="3200" b="1" dirty="0"/>
+              <a:t>連続</a:t>
+            </a:r>
+            <a:r>
+              <a:rPr kumimoji="1" lang="ja-JP" altLang="en-US" sz="3200" b="1" dirty="0" smtClean="0"/>
+              <a:t>領域</a:t>
+            </a:r>
+            <a:endParaRPr kumimoji="1" lang="en-US" altLang="ja-JP" sz="3200" b="1" dirty="0" smtClean="0"/>
+          </a:p>
+        </p:txBody>
+      </p:sp>
+      <p:sp>
+        <p:nvSpPr>
+          <p:cNvPr id="146" name="下矢印 145"/>
           <p:cNvSpPr/>
           <p:nvPr/>
         </p:nvSpPr>
         <p:spPr>
           <a:xfrm>
-            <a:off x="15716051" y="11899206"/>
-            <a:ext cx="10657184" cy="830603"/>
-          </a:xfrm>
-          <a:prstGeom prst="roundRect">
+            <a:off x="21908739" y="17682785"/>
+            <a:ext cx="504056" cy="504056"/>
+          </a:xfrm>
+          <a:prstGeom prst="downArrow">
             <a:avLst/>
           </a:prstGeom>
           <a:solidFill>
-            <a:srgbClr val="CCFFFF"/>
+            <a:srgbClr val="00B050"/>
           </a:solidFill>
           <a:ln>
             <a:noFill/>
@@ -8925,106 +8334,6 @@
           <a:lstStyle/>
           <a:p>
             <a:pPr algn="ctr"/>
-            <a:r>
-              <a:rPr lang="ja-JP" altLang="en-US" sz="4400" b="1" dirty="0" smtClean="0">
-                <a:solidFill>
-                  <a:schemeClr val="tx1"/>
-                </a:solidFill>
-              </a:rPr>
-              <a:t>有限体積法の意味論モデルとは</a:t>
-            </a:r>
-            <a:r>
-              <a:rPr lang="ja-JP" altLang="en-US" sz="4400" b="1" dirty="0">
-                <a:solidFill>
-                  <a:schemeClr val="tx1"/>
-                </a:solidFill>
-              </a:rPr>
-              <a:t>？</a:t>
-            </a:r>
-            <a:endParaRPr kumimoji="1" lang="ja-JP" altLang="en-US" sz="4400" b="1" dirty="0">
-              <a:solidFill>
-                <a:schemeClr val="tx1"/>
-              </a:solidFill>
-            </a:endParaRPr>
-          </a:p>
-        </p:txBody>
-      </p:sp>
-      <p:sp>
-        <p:nvSpPr>
-          <p:cNvPr id="145" name="テキスト ボックス 144"/>
-          <p:cNvSpPr txBox="1"/>
-          <p:nvPr/>
-        </p:nvSpPr>
-        <p:spPr>
-          <a:xfrm>
-            <a:off x="16066335" y="14287664"/>
-            <a:ext cx="1832553" cy="584775"/>
-          </a:xfrm>
-          <a:prstGeom prst="rect">
-            <a:avLst/>
-          </a:prstGeom>
-          <a:noFill/>
-        </p:spPr>
-        <p:txBody>
-          <a:bodyPr wrap="none" rtlCol="0">
-            <a:spAutoFit/>
-          </a:bodyPr>
-          <a:lstStyle/>
-          <a:p>
-            <a:r>
-              <a:rPr lang="ja-JP" altLang="en-US" sz="3200" b="1" dirty="0"/>
-              <a:t>連続</a:t>
-            </a:r>
-            <a:r>
-              <a:rPr kumimoji="1" lang="ja-JP" altLang="en-US" sz="3200" b="1" dirty="0" smtClean="0"/>
-              <a:t>領域</a:t>
-            </a:r>
-            <a:endParaRPr kumimoji="1" lang="en-US" altLang="ja-JP" sz="3200" b="1" dirty="0" smtClean="0"/>
-          </a:p>
-        </p:txBody>
-      </p:sp>
-      <p:sp>
-        <p:nvSpPr>
-          <p:cNvPr id="146" name="下矢印 145"/>
-          <p:cNvSpPr/>
-          <p:nvPr/>
-        </p:nvSpPr>
-        <p:spPr>
-          <a:xfrm>
-            <a:off x="21548699" y="14809142"/>
-            <a:ext cx="504056" cy="504056"/>
-          </a:xfrm>
-          <a:prstGeom prst="downArrow">
-            <a:avLst/>
-          </a:prstGeom>
-          <a:solidFill>
-            <a:srgbClr val="00B050"/>
-          </a:solidFill>
-          <a:ln>
-            <a:noFill/>
-          </a:ln>
-        </p:spPr>
-        <p:style>
-          <a:lnRef idx="2">
-            <a:schemeClr val="accent1">
-              <a:shade val="50000"/>
-            </a:schemeClr>
-          </a:lnRef>
-          <a:fillRef idx="1">
-            <a:schemeClr val="accent1"/>
-          </a:fillRef>
-          <a:effectRef idx="0">
-            <a:schemeClr val="accent1"/>
-          </a:effectRef>
-          <a:fontRef idx="minor">
-            <a:schemeClr val="lt1"/>
-          </a:fontRef>
-        </p:style>
-        <p:txBody>
-          <a:bodyPr rtlCol="0" anchor="ctr"/>
-          <a:lstStyle/>
-          <a:p>
-            <a:pPr algn="ctr"/>
             <a:endParaRPr kumimoji="1" lang="ja-JP" altLang="en-US"/>
           </a:p>
         </p:txBody>
@@ -9037,7 +8346,7 @@
         </p:nvCxnSpPr>
         <p:spPr>
           <a:xfrm>
-            <a:off x="18180000" y="14566408"/>
+            <a:off x="18540040" y="17440051"/>
             <a:ext cx="8280000" cy="0"/>
           </a:xfrm>
           <a:prstGeom prst="straightConnector1">
@@ -9071,7 +8380,7 @@
         </p:nvCxnSpPr>
         <p:spPr>
           <a:xfrm>
-            <a:off x="18668379" y="14440431"/>
+            <a:off x="19028419" y="17314074"/>
             <a:ext cx="0" cy="360000"/>
           </a:xfrm>
           <a:prstGeom prst="line">
@@ -9106,7 +8415,7 @@
         </p:nvCxnSpPr>
         <p:spPr>
           <a:xfrm>
-            <a:off x="25509139" y="14440431"/>
+            <a:off x="25869179" y="17314074"/>
             <a:ext cx="0" cy="360000"/>
           </a:xfrm>
           <a:prstGeom prst="line">
@@ -9141,7 +8450,7 @@
         </p:nvSpPr>
         <p:spPr>
           <a:xfrm>
-            <a:off x="18164323" y="14791720"/>
+            <a:off x="18524363" y="17665363"/>
             <a:ext cx="671979" cy="584775"/>
           </a:xfrm>
           <a:prstGeom prst="rect">
@@ -9171,7 +8480,7 @@
         </p:nvSpPr>
         <p:spPr>
           <a:xfrm>
-            <a:off x="25202391" y="14719712"/>
+            <a:off x="25562431" y="17593355"/>
             <a:ext cx="450764" cy="584775"/>
           </a:xfrm>
           <a:prstGeom prst="rect">
@@ -9201,7 +8510,7 @@
         </p:nvSpPr>
         <p:spPr>
           <a:xfrm>
-            <a:off x="18668379" y="14502857"/>
+            <a:off x="19028419" y="17376500"/>
             <a:ext cx="6840760" cy="225566"/>
           </a:xfrm>
           <a:prstGeom prst="rect">
@@ -9247,7 +8556,7 @@
         </p:nvSpPr>
         <p:spPr>
           <a:xfrm>
-            <a:off x="22124763" y="14800431"/>
+            <a:off x="22484803" y="17674074"/>
             <a:ext cx="1261884" cy="523220"/>
           </a:xfrm>
           <a:prstGeom prst="rect">
@@ -9281,7 +8590,7 @@
         </p:nvSpPr>
         <p:spPr>
           <a:xfrm>
-            <a:off x="24789059" y="15376495"/>
+            <a:off x="25149099" y="18250138"/>
             <a:ext cx="432048" cy="432048"/>
           </a:xfrm>
           <a:prstGeom prst="ellipse">
@@ -9327,7 +8636,7 @@
         </p:nvSpPr>
         <p:spPr>
           <a:xfrm>
-            <a:off x="19172435" y="15376495"/>
+            <a:off x="19532475" y="18250138"/>
             <a:ext cx="432048" cy="432048"/>
           </a:xfrm>
           <a:prstGeom prst="ellipse">
@@ -9373,7 +8682,7 @@
         </p:nvSpPr>
         <p:spPr>
           <a:xfrm>
-            <a:off x="20540587" y="15376495"/>
+            <a:off x="20900627" y="18250138"/>
             <a:ext cx="432048" cy="432048"/>
           </a:xfrm>
           <a:prstGeom prst="ellipse">
@@ -9419,7 +8728,7 @@
         </p:nvSpPr>
         <p:spPr>
           <a:xfrm>
-            <a:off x="21908739" y="15376495"/>
+            <a:off x="22268779" y="18250138"/>
             <a:ext cx="432048" cy="432048"/>
           </a:xfrm>
           <a:prstGeom prst="ellipse">
@@ -9465,7 +8774,7 @@
         </p:nvSpPr>
         <p:spPr>
           <a:xfrm>
-            <a:off x="23348899" y="15376495"/>
+            <a:off x="23708939" y="18250138"/>
             <a:ext cx="432048" cy="432048"/>
           </a:xfrm>
           <a:prstGeom prst="ellipse">
@@ -9511,7 +8820,7 @@
         </p:nvSpPr>
         <p:spPr>
           <a:xfrm>
-            <a:off x="19028419" y="15719113"/>
+            <a:off x="19388459" y="18592756"/>
             <a:ext cx="688009" cy="584775"/>
           </a:xfrm>
           <a:prstGeom prst="rect">
@@ -9545,7 +8854,7 @@
         </p:nvSpPr>
         <p:spPr>
           <a:xfrm>
-            <a:off x="20396571" y="15710402"/>
+            <a:off x="20756611" y="18584045"/>
             <a:ext cx="688009" cy="584775"/>
           </a:xfrm>
           <a:prstGeom prst="rect">
@@ -9579,7 +8888,7 @@
         </p:nvSpPr>
         <p:spPr>
           <a:xfrm>
-            <a:off x="21652778" y="15710402"/>
+            <a:off x="22012818" y="18584045"/>
             <a:ext cx="688009" cy="584775"/>
           </a:xfrm>
           <a:prstGeom prst="rect">
@@ -9613,8 +8922,8 @@
         </p:nvSpPr>
         <p:spPr>
           <a:xfrm>
-            <a:off x="24640245" y="15710402"/>
-            <a:ext cx="724878" cy="584775"/>
+            <a:off x="25000285" y="18584045"/>
+            <a:ext cx="947695" cy="584775"/>
           </a:xfrm>
           <a:prstGeom prst="rect">
             <a:avLst/>
@@ -9632,12 +8941,12 @@
               <a:t>  </a:t>
             </a:r>
             <a:r>
-              <a:rPr kumimoji="1" lang="en-US" altLang="ja-JP" sz="3200" dirty="0" err="1" smtClean="0"/>
+              <a:rPr kumimoji="1" lang="en-US" altLang="ja-JP" sz="3200" dirty="0" smtClean="0"/>
               <a:t>x</a:t>
             </a:r>
             <a:r>
-              <a:rPr lang="en-US" altLang="ja-JP" sz="3200" baseline="-25000" dirty="0" err="1" smtClean="0"/>
-              <a:t>N</a:t>
+              <a:rPr lang="en-US" altLang="ja-JP" sz="3200" baseline="-25000" dirty="0" smtClean="0"/>
+              <a:t>N-1</a:t>
             </a:r>
             <a:endParaRPr kumimoji="1" lang="ja-JP" altLang="en-US" sz="3200" baseline="-25000" dirty="0"/>
           </a:p>
@@ -9651,7 +8960,7 @@
         </p:nvSpPr>
         <p:spPr>
           <a:xfrm>
-            <a:off x="22988859" y="15701691"/>
+            <a:off x="23348899" y="18575334"/>
             <a:ext cx="758541" cy="584775"/>
           </a:xfrm>
           <a:prstGeom prst="rect">
@@ -9681,7 +8990,7 @@
         </p:nvCxnSpPr>
         <p:spPr>
           <a:xfrm>
-            <a:off x="18237251" y="15601230"/>
+            <a:off x="18597291" y="18474873"/>
             <a:ext cx="8280000" cy="0"/>
           </a:xfrm>
           <a:prstGeom prst="straightConnector1">
@@ -9715,7 +9024,7 @@
         </p:nvSpPr>
         <p:spPr>
           <a:xfrm>
-            <a:off x="16218735" y="15295776"/>
+            <a:off x="16578775" y="18169419"/>
             <a:ext cx="1475084" cy="584775"/>
           </a:xfrm>
           <a:prstGeom prst="rect">
@@ -9745,7 +9054,7 @@
         </p:nvSpPr>
         <p:spPr>
           <a:xfrm>
-            <a:off x="26445243" y="14294921"/>
+            <a:off x="26805283" y="17168564"/>
             <a:ext cx="1059906" cy="584775"/>
           </a:xfrm>
           <a:prstGeom prst="rect">
@@ -9787,13 +9096,13 @@
         </p:nvSpPr>
         <p:spPr>
           <a:xfrm>
-            <a:off x="15149903" y="12763302"/>
-            <a:ext cx="13373656" cy="1440160"/>
+            <a:off x="15149903" y="11528055"/>
+            <a:ext cx="13373656" cy="2171352"/>
           </a:xfrm>
         </p:spPr>
         <p:txBody>
           <a:bodyPr>
-            <a:normAutofit fontScale="85000" lnSpcReduction="20000"/>
+            <a:normAutofit lnSpcReduction="10000"/>
           </a:bodyPr>
           <a:lstStyle/>
           <a:p>
@@ -9801,17 +9110,32 @@
               <a:buNone/>
             </a:pPr>
             <a:r>
-              <a:rPr lang="ja-JP" altLang="en-US" b="1" dirty="0" smtClean="0"/>
+              <a:rPr lang="ja-JP" altLang="en-US" sz="3600" b="1" dirty="0"/>
+              <a:t>有限</a:t>
+            </a:r>
+            <a:r>
+              <a:rPr lang="ja-JP" altLang="en-US" sz="3600" b="1" dirty="0" smtClean="0"/>
+              <a:t>体積法の意味論モデルとは？</a:t>
+            </a:r>
+            <a:endParaRPr lang="en-US" altLang="ja-JP" sz="3600" b="1" dirty="0" smtClean="0"/>
+          </a:p>
+          <a:p>
+            <a:r>
+              <a:rPr lang="ja-JP" altLang="en-US" sz="3500" dirty="0" smtClean="0"/>
               <a:t>定型的な数式変換を自動化するためのモデル</a:t>
             </a:r>
-            <a:endParaRPr lang="en-US" altLang="ja-JP" b="1" dirty="0" smtClean="0"/>
-          </a:p>
-          <a:p>
-            <a:r>
-              <a:rPr lang="ja-JP" altLang="en-US" dirty="0" smtClean="0"/>
-              <a:t>テンプレートメタプログラミングで数式テンプレート変換として実装</a:t>
-            </a:r>
-            <a:endParaRPr lang="en-US" altLang="ja-JP" dirty="0" smtClean="0"/>
+            <a:endParaRPr lang="en-US" altLang="ja-JP" sz="3500" dirty="0" smtClean="0"/>
+          </a:p>
+          <a:p>
+            <a:r>
+              <a:rPr lang="ja-JP" altLang="en-US" sz="3500" dirty="0" smtClean="0"/>
+              <a:t>テンプレートメタプログラミング</a:t>
+            </a:r>
+            <a:r>
+              <a:rPr lang="ja-JP" altLang="en-US" sz="3500" dirty="0" smtClean="0"/>
+              <a:t>で数式テンプレート変換として実装</a:t>
+            </a:r>
+            <a:endParaRPr lang="en-US" altLang="ja-JP" sz="3500" dirty="0" smtClean="0"/>
           </a:p>
         </p:txBody>
       </p:sp>
@@ -9823,8 +9147,8 @@
         </p:nvSpPr>
         <p:spPr>
           <a:xfrm>
-            <a:off x="15788059" y="16651734"/>
-            <a:ext cx="2574744" cy="584775"/>
+            <a:off x="16220107" y="23353996"/>
+            <a:ext cx="2613216" cy="584775"/>
           </a:xfrm>
           <a:prstGeom prst="rect">
             <a:avLst/>
@@ -9843,7 +9167,11 @@
             </a:r>
             <a:r>
               <a:rPr lang="en-US" altLang="ja-JP" sz="3200" b="1" dirty="0" smtClean="0"/>
-              <a:t>T(x)</a:t>
+              <a:t>V(x</a:t>
+            </a:r>
+            <a:r>
+              <a:rPr lang="en-US" altLang="ja-JP" sz="3200" b="1" dirty="0" smtClean="0"/>
+              <a:t>)</a:t>
             </a:r>
             <a:endParaRPr kumimoji="1" lang="en-US" altLang="ja-JP" sz="3200" b="1" dirty="0" smtClean="0"/>
           </a:p>
@@ -9857,7 +9185,7 @@
         </p:nvSpPr>
         <p:spPr>
           <a:xfrm>
-            <a:off x="15932075" y="17579127"/>
+            <a:off x="16364123" y="24281389"/>
             <a:ext cx="11573074" cy="707886"/>
           </a:xfrm>
           <a:prstGeom prst="rect">
@@ -9877,11 +9205,15 @@
             </a:r>
             <a:r>
               <a:rPr lang="en-US" altLang="ja-JP" sz="4000" b="1" dirty="0" smtClean="0"/>
-              <a:t>t     =   (     </a:t>
+              <a:t>v    </a:t>
             </a:r>
             <a:r>
               <a:rPr lang="en-US" altLang="ja-JP" sz="4000" b="1" dirty="0" smtClean="0"/>
-              <a:t>t</a:t>
+              <a:t>=   (     </a:t>
+            </a:r>
+            <a:r>
+              <a:rPr lang="en-US" altLang="ja-JP" sz="4000" b="1" dirty="0" smtClean="0"/>
+              <a:t>v</a:t>
             </a:r>
             <a:r>
               <a:rPr lang="en-US" altLang="ja-JP" sz="4000" b="1" baseline="-25000" dirty="0" smtClean="0"/>
@@ -9889,7 +9221,11 @@
             </a:r>
             <a:r>
               <a:rPr lang="en-US" altLang="ja-JP" sz="4000" b="1" dirty="0" smtClean="0"/>
-              <a:t>,      t</a:t>
+              <a:t>,      </a:t>
+            </a:r>
+            <a:r>
+              <a:rPr lang="en-US" altLang="ja-JP" sz="4000" b="1" dirty="0" smtClean="0"/>
+              <a:t>v</a:t>
             </a:r>
             <a:r>
               <a:rPr lang="en-US" altLang="ja-JP" sz="4000" b="1" baseline="-25000" dirty="0" smtClean="0"/>
@@ -9897,7 +9233,11 @@
             </a:r>
             <a:r>
               <a:rPr lang="en-US" altLang="ja-JP" sz="4000" b="1" dirty="0" smtClean="0"/>
-              <a:t>,       t</a:t>
+              <a:t>,       </a:t>
+            </a:r>
+            <a:r>
+              <a:rPr lang="en-US" altLang="ja-JP" sz="4000" b="1" dirty="0" smtClean="0"/>
+              <a:t>v</a:t>
             </a:r>
             <a:r>
               <a:rPr lang="en-US" altLang="ja-JP" sz="4000" b="1" baseline="-25000" dirty="0" smtClean="0"/>
@@ -9908,12 +9248,12 @@
               <a:t>,        … ,        </a:t>
             </a:r>
             <a:r>
-              <a:rPr lang="en-US" altLang="ja-JP" sz="4000" b="1" dirty="0" err="1" smtClean="0"/>
-              <a:t>t</a:t>
-            </a:r>
-            <a:r>
-              <a:rPr lang="en-US" altLang="ja-JP" sz="4000" b="1" baseline="-25000" dirty="0" err="1" smtClean="0"/>
-              <a:t>N</a:t>
+              <a:rPr lang="en-US" altLang="ja-JP" sz="4000" b="1" dirty="0" smtClean="0"/>
+              <a:t>v</a:t>
+            </a:r>
+            <a:r>
+              <a:rPr lang="en-US" altLang="ja-JP" sz="4000" b="1" baseline="-25000" dirty="0" smtClean="0"/>
+              <a:t>N-1</a:t>
             </a:r>
             <a:r>
               <a:rPr lang="en-US" altLang="ja-JP" sz="4000" b="1" dirty="0" smtClean="0"/>
@@ -9921,11 +9261,7 @@
             </a:r>
             <a:r>
               <a:rPr lang="en-US" altLang="ja-JP" sz="4000" b="1" dirty="0" smtClean="0"/>
-              <a:t>)</a:t>
-            </a:r>
-            <a:r>
-              <a:rPr lang="en-US" altLang="ja-JP" sz="4000" b="1" dirty="0" smtClean="0"/>
-              <a:t>      </a:t>
+              <a:t>)      </a:t>
             </a:r>
             <a:endParaRPr kumimoji="1" lang="en-US" altLang="ja-JP" sz="4000" b="1" dirty="0" smtClean="0"/>
           </a:p>
@@ -9939,7 +9275,7 @@
         </p:nvSpPr>
         <p:spPr>
           <a:xfrm>
-            <a:off x="18668379" y="16794919"/>
+            <a:off x="19100427" y="23497181"/>
             <a:ext cx="6840760" cy="225566"/>
           </a:xfrm>
           <a:prstGeom prst="rect">
@@ -9999,7 +9335,7 @@
         </p:nvSpPr>
         <p:spPr>
           <a:xfrm>
-            <a:off x="21620707" y="17155790"/>
+            <a:off x="22052755" y="23858052"/>
             <a:ext cx="504056" cy="504056"/>
           </a:xfrm>
           <a:prstGeom prst="downArrow">
@@ -10045,7 +9381,7 @@
         </p:nvSpPr>
         <p:spPr>
           <a:xfrm>
-            <a:off x="22196771" y="17147079"/>
+            <a:off x="22628819" y="23849341"/>
             <a:ext cx="1261884" cy="523220"/>
           </a:xfrm>
           <a:prstGeom prst="rect">
@@ -10094,7 +9430,7 @@
         </p:blipFill>
         <p:spPr bwMode="auto">
           <a:xfrm>
-            <a:off x="17156211" y="19617478"/>
+            <a:off x="17355467" y="29974436"/>
             <a:ext cx="618173" cy="994696"/>
           </a:xfrm>
           <a:prstGeom prst="rect">
@@ -10148,7 +9484,7 @@
         </p:blipFill>
         <p:spPr bwMode="auto">
           <a:xfrm>
-            <a:off x="20468579" y="18739966"/>
+            <a:off x="20667835" y="29096924"/>
             <a:ext cx="5702999" cy="2749487"/>
           </a:xfrm>
           <a:prstGeom prst="rect">
@@ -10187,7 +9523,7 @@
         </p:nvSpPr>
         <p:spPr>
           <a:xfrm rot="16200000">
-            <a:off x="18739992" y="19604458"/>
+            <a:off x="18939248" y="29961416"/>
             <a:ext cx="504056" cy="935314"/>
           </a:xfrm>
           <a:prstGeom prst="downArrow">
@@ -10233,7 +9569,7 @@
         </p:nvSpPr>
         <p:spPr>
           <a:xfrm>
-            <a:off x="16383701" y="18955990"/>
+            <a:off x="16582957" y="29312948"/>
             <a:ext cx="1420582" cy="584775"/>
           </a:xfrm>
           <a:prstGeom prst="rect">
@@ -10263,7 +9599,7 @@
         </p:nvSpPr>
         <p:spPr>
           <a:xfrm>
-            <a:off x="19460467" y="18883982"/>
+            <a:off x="19659723" y="29240940"/>
             <a:ext cx="1008609" cy="584775"/>
           </a:xfrm>
           <a:prstGeom prst="rect">
@@ -10293,7 +9629,7 @@
         </p:nvSpPr>
         <p:spPr>
           <a:xfrm>
-            <a:off x="18524363" y="20304978"/>
+            <a:off x="18723619" y="30661936"/>
             <a:ext cx="1261884" cy="523220"/>
           </a:xfrm>
           <a:prstGeom prst="rect">
@@ -10327,7 +9663,7 @@
         </p:nvSpPr>
         <p:spPr>
           <a:xfrm>
-            <a:off x="15428019" y="16579726"/>
+            <a:off x="15860067" y="23281988"/>
             <a:ext cx="13177464" cy="1800199"/>
           </a:xfrm>
           <a:prstGeom prst="roundRect">
@@ -10336,10 +9672,7 @@
           <a:noFill/>
           <a:ln>
             <a:solidFill>
-              <a:schemeClr val="tx1">
-                <a:lumMod val="65000"/>
-                <a:lumOff val="35000"/>
-              </a:schemeClr>
+              <a:srgbClr val="00B050"/>
             </a:solidFill>
             <a:prstDash val="sysDash"/>
           </a:ln>
@@ -10377,7 +9710,7 @@
         </p:nvSpPr>
         <p:spPr>
           <a:xfrm>
-            <a:off x="15356011" y="14203462"/>
+            <a:off x="15716051" y="17082333"/>
             <a:ext cx="13177464" cy="2083004"/>
           </a:xfrm>
           <a:prstGeom prst="roundRect">
@@ -10386,10 +9719,7 @@
           <a:noFill/>
           <a:ln>
             <a:solidFill>
-              <a:schemeClr val="tx1">
-                <a:lumMod val="65000"/>
-                <a:lumOff val="35000"/>
-              </a:schemeClr>
+              <a:srgbClr val="00B050"/>
             </a:solidFill>
             <a:prstDash val="sysDash"/>
           </a:ln>
@@ -10427,7 +9757,7 @@
         </p:nvSpPr>
         <p:spPr>
           <a:xfrm>
-            <a:off x="22799721" y="24131855"/>
+            <a:off x="23231769" y="16288500"/>
             <a:ext cx="5445722" cy="584775"/>
           </a:xfrm>
           <a:prstGeom prst="rect">
@@ -10442,18 +9772,18 @@
           <a:lstStyle/>
           <a:p>
             <a:r>
-              <a:rPr kumimoji="1" lang="ja-JP" altLang="en-US" sz="3200" b="1" dirty="0" smtClean="0"/>
+              <a:rPr kumimoji="1" lang="ja-JP" altLang="en-US" sz="3200" dirty="0" smtClean="0"/>
               <a:t>長さ</a:t>
             </a:r>
             <a:r>
-              <a:rPr kumimoji="1" lang="en-US" altLang="ja-JP" sz="3200" b="1" dirty="0" smtClean="0"/>
+              <a:rPr kumimoji="1" lang="en-US" altLang="ja-JP" sz="3200" dirty="0" smtClean="0"/>
               <a:t>L </a:t>
             </a:r>
             <a:r>
-              <a:rPr kumimoji="1" lang="ja-JP" altLang="en-US" sz="3200" b="1" dirty="0" smtClean="0"/>
+              <a:rPr kumimoji="1" lang="ja-JP" altLang="en-US" sz="3200" dirty="0" smtClean="0"/>
               <a:t>の連続領域をグリッドに</a:t>
             </a:r>
-            <a:endParaRPr kumimoji="1" lang="en-US" altLang="ja-JP" sz="3200" b="1" dirty="0" smtClean="0"/>
+            <a:endParaRPr kumimoji="1" lang="en-US" altLang="ja-JP" sz="3200" dirty="0" smtClean="0"/>
           </a:p>
         </p:txBody>
       </p:sp>
@@ -10465,7 +9795,7 @@
         </p:nvSpPr>
         <p:spPr>
           <a:xfrm>
-            <a:off x="22844843" y="24851935"/>
+            <a:off x="23034014" y="19681587"/>
             <a:ext cx="5067413" cy="584775"/>
           </a:xfrm>
           <a:prstGeom prst="rect">
@@ -10480,26 +9810,26 @@
           <a:lstStyle/>
           <a:p>
             <a:r>
-              <a:rPr lang="ja-JP" altLang="en-US" sz="3200" b="1" dirty="0" smtClean="0"/>
+              <a:rPr lang="ja-JP" altLang="en-US" sz="3200" dirty="0" smtClean="0"/>
               <a:t>左端の境界温度を</a:t>
             </a:r>
             <a:r>
-              <a:rPr lang="en-US" altLang="ja-JP" sz="3200" b="1" dirty="0" smtClean="0"/>
+              <a:rPr lang="en-US" altLang="ja-JP" sz="3200" dirty="0" smtClean="0"/>
               <a:t>T</a:t>
             </a:r>
             <a:r>
-              <a:rPr lang="en-US" altLang="ja-JP" sz="3200" b="1" baseline="-25000" dirty="0" smtClean="0"/>
+              <a:rPr lang="en-US" altLang="ja-JP" sz="3200" baseline="-25000" dirty="0" smtClean="0"/>
               <a:t>B</a:t>
             </a:r>
             <a:r>
-              <a:rPr lang="en-US" altLang="ja-JP" sz="3200" b="1" dirty="0" smtClean="0"/>
+              <a:rPr lang="en-US" altLang="ja-JP" sz="3200" dirty="0" smtClean="0"/>
               <a:t> </a:t>
             </a:r>
             <a:r>
-              <a:rPr lang="ja-JP" altLang="en-US" sz="3200" b="1" dirty="0" smtClean="0"/>
+              <a:rPr lang="ja-JP" altLang="en-US" sz="3200" dirty="0" smtClean="0"/>
               <a:t>で固定</a:t>
             </a:r>
-            <a:endParaRPr lang="en-US" altLang="ja-JP" sz="3200" b="1" dirty="0" smtClean="0"/>
+            <a:endParaRPr lang="en-US" altLang="ja-JP" sz="3200" dirty="0" smtClean="0"/>
           </a:p>
         </p:txBody>
       </p:sp>
@@ -10511,7 +9841,7 @@
         </p:nvSpPr>
         <p:spPr>
           <a:xfrm>
-            <a:off x="22844843" y="25788039"/>
+            <a:off x="23034014" y="20545683"/>
             <a:ext cx="3480440" cy="584775"/>
           </a:xfrm>
           <a:prstGeom prst="rect">
@@ -10526,10 +9856,10 @@
           <a:lstStyle/>
           <a:p>
             <a:r>
-              <a:rPr lang="ja-JP" altLang="en-US" sz="3200" b="1" dirty="0" smtClean="0"/>
+              <a:rPr lang="ja-JP" altLang="en-US" sz="3200" dirty="0" smtClean="0"/>
               <a:t>右端の境界は断熱</a:t>
             </a:r>
-            <a:endParaRPr lang="en-US" altLang="ja-JP" sz="3200" b="1" dirty="0" smtClean="0"/>
+            <a:endParaRPr lang="en-US" altLang="ja-JP" sz="3200" dirty="0" smtClean="0"/>
           </a:p>
         </p:txBody>
       </p:sp>
@@ -10541,8 +9871,8 @@
         </p:nvSpPr>
         <p:spPr>
           <a:xfrm>
-            <a:off x="22727221" y="26948878"/>
-            <a:ext cx="4892686" cy="584775"/>
+            <a:off x="23136733" y="25695127"/>
+            <a:ext cx="4698722" cy="584775"/>
           </a:xfrm>
           <a:prstGeom prst="rect">
             <a:avLst/>
@@ -10556,10 +9886,10 @@
           <a:lstStyle/>
           <a:p>
             <a:r>
-              <a:rPr lang="ja-JP" altLang="en-US" sz="3200" b="1" dirty="0" smtClean="0"/>
+              <a:rPr lang="ja-JP" altLang="en-US" sz="3200" dirty="0" smtClean="0"/>
               <a:t>微分方程式の演算子部分</a:t>
             </a:r>
-            <a:endParaRPr lang="en-US" altLang="ja-JP" sz="3200" b="1" dirty="0" smtClean="0"/>
+            <a:endParaRPr lang="en-US" altLang="ja-JP" sz="3200" dirty="0" smtClean="0"/>
           </a:p>
         </p:txBody>
       </p:sp>
@@ -10586,7 +9916,7 @@
         </p:blipFill>
         <p:spPr bwMode="auto">
           <a:xfrm>
-            <a:off x="23636931" y="27423582"/>
+            <a:off x="24056407" y="26436112"/>
             <a:ext cx="2185416" cy="1109472"/>
           </a:xfrm>
           <a:prstGeom prst="rect">
@@ -10625,7 +9955,7 @@
         </p:nvSpPr>
         <p:spPr>
           <a:xfrm>
-            <a:off x="22879621" y="29244423"/>
+            <a:off x="23036241" y="28011577"/>
             <a:ext cx="4237057" cy="584775"/>
           </a:xfrm>
           <a:prstGeom prst="rect">
@@ -10640,18 +9970,18 @@
           <a:lstStyle/>
           <a:p>
             <a:r>
-              <a:rPr lang="ja-JP" altLang="en-US" sz="3200" b="1" dirty="0" smtClean="0"/>
+              <a:rPr lang="ja-JP" altLang="en-US" sz="3200" dirty="0" smtClean="0"/>
               <a:t>演算子を行列 </a:t>
             </a:r>
             <a:r>
-              <a:rPr lang="en-US" altLang="ja-JP" sz="3200" b="1" dirty="0" smtClean="0"/>
+              <a:rPr lang="en-US" altLang="ja-JP" sz="3200" dirty="0" smtClean="0"/>
               <a:t>C </a:t>
             </a:r>
             <a:r>
-              <a:rPr lang="ja-JP" altLang="en-US" sz="3200" b="1" dirty="0" smtClean="0"/>
+              <a:rPr lang="ja-JP" altLang="en-US" sz="3200" dirty="0" smtClean="0"/>
               <a:t>へ変換</a:t>
             </a:r>
-            <a:endParaRPr lang="en-US" altLang="ja-JP" sz="3200" b="1" dirty="0" smtClean="0"/>
+            <a:endParaRPr lang="en-US" altLang="ja-JP" sz="3200" dirty="0" smtClean="0"/>
           </a:p>
         </p:txBody>
       </p:sp>
@@ -10663,7 +9993,7 @@
         </p:nvSpPr>
         <p:spPr>
           <a:xfrm>
-            <a:off x="22916851" y="30549278"/>
+            <a:off x="23132875" y="22120822"/>
             <a:ext cx="4815742" cy="584775"/>
           </a:xfrm>
           <a:prstGeom prst="rect">
@@ -10678,70 +10008,22 @@
           <a:lstStyle/>
           <a:p>
             <a:r>
-              <a:rPr lang="ja-JP" altLang="en-US" sz="3200" b="1" dirty="0" smtClean="0"/>
+              <a:rPr lang="ja-JP" altLang="en-US" sz="3200" dirty="0" smtClean="0"/>
               <a:t>定数項をベクトル </a:t>
             </a:r>
             <a:r>
+              <a:rPr lang="en-US" altLang="ja-JP" sz="3200" b="1" dirty="0" smtClean="0"/>
+              <a:t>b</a:t>
+            </a:r>
+            <a:r>
               <a:rPr lang="en-US" altLang="ja-JP" sz="3200" dirty="0" smtClean="0"/>
-              <a:t>b</a:t>
-            </a:r>
-            <a:r>
-              <a:rPr lang="en-US" altLang="ja-JP" sz="3200" b="1" dirty="0" smtClean="0"/>
               <a:t> </a:t>
             </a:r>
             <a:r>
-              <a:rPr lang="ja-JP" altLang="en-US" sz="3200" b="1" dirty="0" smtClean="0"/>
+              <a:rPr lang="ja-JP" altLang="en-US" sz="3200" dirty="0" smtClean="0"/>
               <a:t>へ変換</a:t>
             </a:r>
-            <a:endParaRPr lang="en-US" altLang="ja-JP" sz="3200" b="1" dirty="0" smtClean="0"/>
-          </a:p>
-        </p:txBody>
-      </p:sp>
-      <p:sp>
-        <p:nvSpPr>
-          <p:cNvPr id="215" name="右中かっこ 214"/>
-          <p:cNvSpPr/>
-          <p:nvPr/>
-        </p:nvSpPr>
-        <p:spPr>
-          <a:xfrm>
-            <a:off x="22916851" y="31834670"/>
-            <a:ext cx="504056" cy="2170992"/>
-          </a:xfrm>
-          <a:prstGeom prst="rightBrace">
-            <a:avLst>
-              <a:gd name="adj1" fmla="val 30227"/>
-              <a:gd name="adj2" fmla="val 50000"/>
-            </a:avLst>
-          </a:prstGeom>
-          <a:ln>
-            <a:solidFill>
-              <a:schemeClr val="bg1">
-                <a:lumMod val="50000"/>
-              </a:schemeClr>
-            </a:solidFill>
-          </a:ln>
-        </p:spPr>
-        <p:style>
-          <a:lnRef idx="1">
-            <a:schemeClr val="accent1"/>
-          </a:lnRef>
-          <a:fillRef idx="0">
-            <a:schemeClr val="accent1"/>
-          </a:fillRef>
-          <a:effectRef idx="0">
-            <a:schemeClr val="accent1"/>
-          </a:effectRef>
-          <a:fontRef idx="minor">
-            <a:schemeClr val="tx1"/>
-          </a:fontRef>
-        </p:style>
-        <p:txBody>
-          <a:bodyPr rtlCol="0" anchor="ctr"/>
-          <a:lstStyle/>
-          <a:p>
-            <a:pPr algn="ctr"/>
-            <a:endParaRPr kumimoji="1" lang="ja-JP" altLang="en-US"/>
+            <a:endParaRPr lang="en-US" altLang="ja-JP" sz="3200" dirty="0" smtClean="0"/>
           </a:p>
         </p:txBody>
       </p:sp>
@@ -10753,7 +10035,7 @@
         </p:nvSpPr>
         <p:spPr>
           <a:xfrm>
-            <a:off x="23564923" y="32421486"/>
+            <a:off x="23564923" y="32696318"/>
             <a:ext cx="3480440" cy="1077218"/>
           </a:xfrm>
           <a:prstGeom prst="rect">
@@ -10768,21 +10050,21 @@
           <a:lstStyle/>
           <a:p>
             <a:r>
-              <a:rPr lang="ja-JP" altLang="en-US" sz="3200" b="1" dirty="0"/>
+              <a:rPr lang="ja-JP" altLang="en-US" sz="3200" dirty="0"/>
               <a:t>境界</a:t>
             </a:r>
             <a:r>
-              <a:rPr lang="ja-JP" altLang="en-US" sz="3200" b="1" dirty="0" smtClean="0"/>
+              <a:rPr lang="ja-JP" altLang="en-US" sz="3200" dirty="0" smtClean="0"/>
               <a:t>条件による</a:t>
             </a:r>
-            <a:endParaRPr lang="en-US" altLang="ja-JP" sz="3200" b="1" dirty="0" smtClean="0"/>
-          </a:p>
-          <a:p>
-            <a:r>
-              <a:rPr lang="ja-JP" altLang="en-US" sz="3200" b="1" dirty="0" smtClean="0"/>
+            <a:endParaRPr lang="en-US" altLang="ja-JP" sz="3200" dirty="0" smtClean="0"/>
+          </a:p>
+          <a:p>
+            <a:r>
+              <a:rPr lang="ja-JP" altLang="en-US" sz="3200" dirty="0" smtClean="0"/>
               <a:t>行列方程式の補正</a:t>
             </a:r>
-            <a:endParaRPr lang="en-US" altLang="ja-JP" sz="3200" b="1" dirty="0" smtClean="0"/>
+            <a:endParaRPr lang="en-US" altLang="ja-JP" sz="3200" dirty="0" smtClean="0"/>
           </a:p>
         </p:txBody>
       </p:sp>
@@ -10839,7 +10121,7 @@
         </p:blipFill>
         <p:spPr bwMode="auto">
           <a:xfrm>
-            <a:off x="24594312" y="33501606"/>
+            <a:off x="24594312" y="33776438"/>
             <a:ext cx="1541621" cy="592931"/>
           </a:xfrm>
           <a:prstGeom prst="rect">
@@ -10870,6 +10152,847 @@
           </a:extLst>
         </p:spPr>
       </p:pic>
+      <p:sp>
+        <p:nvSpPr>
+          <p:cNvPr id="109" name="コンテンツ プレースホルダー 4"/>
+          <p:cNvSpPr>
+            <a:spLocks noGrp="1"/>
+          </p:cNvSpPr>
+          <p:nvPr>
+            <p:ph sz="half" idx="1"/>
+          </p:nvPr>
+        </p:nvSpPr>
+        <p:spPr>
+          <a:xfrm>
+            <a:off x="1386459" y="12475270"/>
+            <a:ext cx="13373656" cy="936104"/>
+          </a:xfrm>
+        </p:spPr>
+        <p:txBody>
+          <a:bodyPr>
+            <a:noAutofit/>
+          </a:bodyPr>
+          <a:lstStyle/>
+          <a:p>
+            <a:pPr marL="0" indent="0">
+              <a:buNone/>
+            </a:pPr>
+            <a:r>
+              <a:rPr lang="ja-JP" altLang="en-US" sz="3600" b="1" dirty="0" smtClean="0"/>
+              <a:t>数式変換としてのプログラミング</a:t>
+            </a:r>
+            <a:endParaRPr lang="en-US" altLang="ja-JP" sz="3600" b="1" dirty="0" smtClean="0"/>
+          </a:p>
+        </p:txBody>
+      </p:sp>
+      <p:sp>
+        <p:nvSpPr>
+          <p:cNvPr id="110" name="コンテンツ プレースホルダー 4"/>
+          <p:cNvSpPr>
+            <a:spLocks noGrp="1"/>
+          </p:cNvSpPr>
+          <p:nvPr>
+            <p:ph sz="half" idx="1"/>
+          </p:nvPr>
+        </p:nvSpPr>
+        <p:spPr>
+          <a:xfrm>
+            <a:off x="1190267" y="18523942"/>
+            <a:ext cx="13373656" cy="2431141"/>
+          </a:xfrm>
+        </p:spPr>
+        <p:txBody>
+          <a:bodyPr>
+            <a:normAutofit/>
+          </a:bodyPr>
+          <a:lstStyle/>
+          <a:p>
+            <a:pPr marL="0" indent="0">
+              <a:buNone/>
+            </a:pPr>
+            <a:r>
+              <a:rPr lang="ja-JP" altLang="en-US" sz="3600" b="1" dirty="0" smtClean="0"/>
+              <a:t>なぜ</a:t>
+            </a:r>
+            <a:r>
+              <a:rPr lang="en-US" altLang="ja-JP" sz="3600" b="1" dirty="0" smtClean="0"/>
+              <a:t>DSL?</a:t>
+            </a:r>
+            <a:endParaRPr lang="en-US" altLang="ja-JP" sz="3600" b="1" dirty="0" smtClean="0"/>
+          </a:p>
+          <a:p>
+            <a:r>
+              <a:rPr lang="ja-JP" altLang="en-US" sz="3200" dirty="0" smtClean="0"/>
+              <a:t>計算科学者が研究開発に専念するためには、コンパイラに低次の数式変換を任せて、プログラミングでは高次の数式変換を扱う必要がある。</a:t>
+            </a:r>
+            <a:endParaRPr lang="en-US" altLang="ja-JP" sz="3200" dirty="0" smtClean="0"/>
+          </a:p>
+        </p:txBody>
+      </p:sp>
+      <p:sp>
+        <p:nvSpPr>
+          <p:cNvPr id="111" name="コンテンツ プレースホルダー 4"/>
+          <p:cNvSpPr>
+            <a:spLocks noGrp="1"/>
+          </p:cNvSpPr>
+          <p:nvPr>
+            <p:ph sz="half" idx="1"/>
+          </p:nvPr>
+        </p:nvSpPr>
+        <p:spPr>
+          <a:xfrm>
+            <a:off x="15302302" y="14491494"/>
+            <a:ext cx="13974421" cy="1584176"/>
+          </a:xfrm>
+        </p:spPr>
+        <p:txBody>
+          <a:bodyPr>
+            <a:normAutofit/>
+          </a:bodyPr>
+          <a:lstStyle/>
+          <a:p>
+            <a:pPr marL="0" indent="0">
+              <a:buNone/>
+            </a:pPr>
+            <a:r>
+              <a:rPr lang="ja-JP" altLang="en-US" sz="3600" b="1" dirty="0" smtClean="0"/>
+              <a:t>ソースコードを、</a:t>
+            </a:r>
+            <a:r>
+              <a:rPr lang="en-US" altLang="ja-JP" sz="3600" b="1" dirty="0" smtClean="0"/>
+              <a:t>DSL</a:t>
+            </a:r>
+            <a:r>
+              <a:rPr lang="ja-JP" altLang="en-US" sz="3600" b="1" dirty="0"/>
+              <a:t>コンパイラ</a:t>
+            </a:r>
+            <a:r>
+              <a:rPr lang="ja-JP" altLang="en-US" sz="3600" b="1" dirty="0" smtClean="0"/>
+              <a:t>が</a:t>
+            </a:r>
+            <a:r>
+              <a:rPr lang="ja-JP" altLang="en-US" sz="3600" b="1" dirty="0" smtClean="0">
+                <a:solidFill>
+                  <a:srgbClr val="00B050"/>
+                </a:solidFill>
+              </a:rPr>
+              <a:t>有限体積法の意味論</a:t>
+            </a:r>
+            <a:r>
+              <a:rPr lang="ja-JP" altLang="en-US" sz="3600" b="1" dirty="0" smtClean="0"/>
+              <a:t>に基づいて、低レベルのコードに変換し、</a:t>
+            </a:r>
+            <a:r>
+              <a:rPr lang="en-US" altLang="ja-JP" sz="3600" b="1" dirty="0" smtClean="0"/>
+              <a:t>C++</a:t>
+            </a:r>
+            <a:r>
+              <a:rPr lang="ja-JP" altLang="en-US" sz="3600" b="1" dirty="0" smtClean="0"/>
+              <a:t>コンパライラが実行コードに変換する。</a:t>
+            </a:r>
+            <a:endParaRPr lang="en-US" altLang="ja-JP" sz="3600" b="1" dirty="0" smtClean="0"/>
+          </a:p>
+        </p:txBody>
+      </p:sp>
+      <p:sp>
+        <p:nvSpPr>
+          <p:cNvPr id="113" name="正方形/長方形 112"/>
+          <p:cNvSpPr/>
+          <p:nvPr/>
+        </p:nvSpPr>
+        <p:spPr bwMode="blackGray">
+          <a:xfrm>
+            <a:off x="15800009" y="16225203"/>
+            <a:ext cx="7180104" cy="739244"/>
+          </a:xfrm>
+          <a:prstGeom prst="rect">
+            <a:avLst/>
+          </a:prstGeom>
+          <a:solidFill>
+            <a:srgbClr val="808080">
+              <a:lumMod val="20000"/>
+              <a:lumOff val="80000"/>
+            </a:srgbClr>
+          </a:solidFill>
+          <a:ln w="9525">
+            <a:noFill/>
+            <a:round/>
+            <a:headEnd/>
+            <a:tailEnd/>
+          </a:ln>
+          <a:extLst/>
+        </p:spPr>
+        <p:txBody>
+          <a:bodyPr anchor="ctr"/>
+          <a:lstStyle/>
+          <a:p>
+            <a:pPr marL="0" marR="0" lvl="0" indent="0" defTabSz="914400" eaLnBrk="1" fontAlgn="base" latinLnBrk="0" hangingPunct="1">
+              <a:lnSpc>
+                <a:spcPct val="100000"/>
+              </a:lnSpc>
+              <a:spcBef>
+                <a:spcPct val="0"/>
+              </a:spcBef>
+              <a:spcAft>
+                <a:spcPct val="0"/>
+              </a:spcAft>
+              <a:buClrTx/>
+              <a:buSzTx/>
+              <a:buFontTx/>
+              <a:buNone/>
+              <a:tabLst/>
+              <a:defRPr/>
+            </a:pPr>
+            <a:r>
+              <a:rPr kumimoji="0" lang="en-US" altLang="ja-JP" sz="2800" b="0" i="0" u="none" strike="noStrike" kern="0" cap="none" spc="0" normalizeH="0" baseline="0" noProof="0" dirty="0">
+                <a:ln>
+                  <a:noFill/>
+                </a:ln>
+                <a:solidFill>
+                  <a:srgbClr val="000000"/>
+                </a:solidFill>
+                <a:effectLst/>
+                <a:uLnTx/>
+                <a:uFillTx/>
+                <a:latin typeface="Courier New" panose="02070309020205020404" pitchFamily="49" charset="0"/>
+                <a:cs typeface="Courier New" panose="02070309020205020404" pitchFamily="49" charset="0"/>
+              </a:rPr>
+              <a:t>FVM::Grid grid( N, L</a:t>
+            </a:r>
+            <a:r>
+              <a:rPr kumimoji="0" lang="en-US" altLang="ja-JP" sz="2800" b="0" i="0" u="none" strike="noStrike" kern="0" cap="none" spc="0" normalizeH="0" baseline="0" noProof="0" dirty="0" smtClean="0">
+                <a:ln>
+                  <a:noFill/>
+                </a:ln>
+                <a:solidFill>
+                  <a:srgbClr val="000000"/>
+                </a:solidFill>
+                <a:effectLst/>
+                <a:uLnTx/>
+                <a:uFillTx/>
+                <a:latin typeface="Courier New" panose="02070309020205020404" pitchFamily="49" charset="0"/>
+                <a:cs typeface="Courier New" panose="02070309020205020404" pitchFamily="49" charset="0"/>
+              </a:rPr>
+              <a:t>);</a:t>
+            </a:r>
+            <a:endParaRPr kumimoji="0" lang="en-US" altLang="ja-JP" sz="2800" b="0" i="0" u="none" strike="noStrike" kern="0" cap="none" spc="0" normalizeH="0" baseline="0" noProof="0" dirty="0" smtClean="0">
+              <a:ln>
+                <a:noFill/>
+              </a:ln>
+              <a:solidFill>
+                <a:srgbClr val="000000"/>
+              </a:solidFill>
+              <a:effectLst/>
+              <a:uLnTx/>
+              <a:uFillTx/>
+              <a:latin typeface="Courier New" panose="02070309020205020404" pitchFamily="49" charset="0"/>
+              <a:cs typeface="Courier New" panose="02070309020205020404" pitchFamily="49" charset="0"/>
+            </a:endParaRPr>
+          </a:p>
+        </p:txBody>
+      </p:sp>
+      <p:sp>
+        <p:nvSpPr>
+          <p:cNvPr id="114" name="正方形/長方形 113"/>
+          <p:cNvSpPr/>
+          <p:nvPr/>
+        </p:nvSpPr>
+        <p:spPr bwMode="blackGray">
+          <a:xfrm>
+            <a:off x="15788059" y="19609579"/>
+            <a:ext cx="7180104" cy="1800200"/>
+          </a:xfrm>
+          <a:prstGeom prst="rect">
+            <a:avLst/>
+          </a:prstGeom>
+          <a:solidFill>
+            <a:srgbClr val="808080">
+              <a:lumMod val="20000"/>
+              <a:lumOff val="80000"/>
+            </a:srgbClr>
+          </a:solidFill>
+          <a:ln w="9525">
+            <a:noFill/>
+            <a:round/>
+            <a:headEnd/>
+            <a:tailEnd/>
+          </a:ln>
+          <a:extLst/>
+        </p:spPr>
+        <p:txBody>
+          <a:bodyPr anchor="ctr"/>
+          <a:lstStyle/>
+          <a:p>
+            <a:pPr marL="0" marR="0" lvl="0" indent="0" defTabSz="914400" eaLnBrk="1" fontAlgn="base" latinLnBrk="0" hangingPunct="1">
+              <a:lnSpc>
+                <a:spcPct val="100000"/>
+              </a:lnSpc>
+              <a:spcBef>
+                <a:spcPct val="0"/>
+              </a:spcBef>
+              <a:spcAft>
+                <a:spcPct val="0"/>
+              </a:spcAft>
+              <a:buClrTx/>
+              <a:buSzTx/>
+              <a:buFontTx/>
+              <a:buNone/>
+              <a:tabLst/>
+              <a:defRPr/>
+            </a:pPr>
+            <a:r>
+              <a:rPr kumimoji="0" lang="en-US" altLang="ja-JP" sz="2800" b="0" i="0" u="none" strike="noStrike" kern="0" cap="none" spc="0" normalizeH="0" baseline="0" noProof="0" dirty="0" err="1" smtClean="0">
+                <a:ln>
+                  <a:noFill/>
+                </a:ln>
+                <a:solidFill>
+                  <a:srgbClr val="000000"/>
+                </a:solidFill>
+                <a:effectLst/>
+                <a:uLnTx/>
+                <a:uFillTx/>
+                <a:latin typeface="Courier New" panose="02070309020205020404" pitchFamily="49" charset="0"/>
+                <a:cs typeface="Courier New" panose="02070309020205020404" pitchFamily="49" charset="0"/>
+              </a:rPr>
+              <a:t>grid.addDirichletBoundary</a:t>
+            </a:r>
+            <a:r>
+              <a:rPr kumimoji="0" lang="en-US" altLang="ja-JP" sz="2800" b="0" i="0" u="none" strike="noStrike" kern="0" cap="none" spc="0" normalizeH="0" baseline="0" noProof="0" dirty="0">
+                <a:ln>
+                  <a:noFill/>
+                </a:ln>
+                <a:solidFill>
+                  <a:srgbClr val="000000"/>
+                </a:solidFill>
+                <a:effectLst/>
+                <a:uLnTx/>
+                <a:uFillTx/>
+                <a:latin typeface="Courier New" panose="02070309020205020404" pitchFamily="49" charset="0"/>
+                <a:cs typeface="Courier New" panose="02070309020205020404" pitchFamily="49" charset="0"/>
+              </a:rPr>
+              <a:t>(</a:t>
+            </a:r>
+            <a:br>
+              <a:rPr kumimoji="0" lang="en-US" altLang="ja-JP" sz="2800" b="0" i="0" u="none" strike="noStrike" kern="0" cap="none" spc="0" normalizeH="0" baseline="0" noProof="0" dirty="0">
+                <a:ln>
+                  <a:noFill/>
+                </a:ln>
+                <a:solidFill>
+                  <a:srgbClr val="000000"/>
+                </a:solidFill>
+                <a:effectLst/>
+                <a:uLnTx/>
+                <a:uFillTx/>
+                <a:latin typeface="Courier New" panose="02070309020205020404" pitchFamily="49" charset="0"/>
+                <a:cs typeface="Courier New" panose="02070309020205020404" pitchFamily="49" charset="0"/>
+              </a:rPr>
+            </a:br>
+            <a:r>
+              <a:rPr kumimoji="0" lang="en-US" altLang="ja-JP" sz="2800" b="0" i="0" u="none" strike="noStrike" kern="0" cap="none" spc="0" normalizeH="0" baseline="0" noProof="0" dirty="0">
+                <a:ln>
+                  <a:noFill/>
+                </a:ln>
+                <a:solidFill>
+                  <a:srgbClr val="000000"/>
+                </a:solidFill>
+                <a:effectLst/>
+                <a:uLnTx/>
+                <a:uFillTx/>
+                <a:latin typeface="Courier New" panose="02070309020205020404" pitchFamily="49" charset="0"/>
+                <a:cs typeface="Courier New" panose="02070309020205020404" pitchFamily="49" charset="0"/>
+              </a:rPr>
+              <a:t>    </a:t>
+            </a:r>
+            <a:r>
+              <a:rPr kumimoji="0" lang="ja-JP" altLang="en-US" sz="2800" b="0" i="0" u="none" strike="noStrike" kern="0" cap="none" spc="0" normalizeH="0" baseline="0" noProof="0" dirty="0">
+                <a:ln>
+                  <a:noFill/>
+                </a:ln>
+                <a:solidFill>
+                  <a:srgbClr val="000000"/>
+                </a:solidFill>
+                <a:effectLst/>
+                <a:uLnTx/>
+                <a:uFillTx/>
+                <a:latin typeface="Courier New" panose="02070309020205020404" pitchFamily="49" charset="0"/>
+                <a:cs typeface="Courier New" panose="02070309020205020404" pitchFamily="49" charset="0"/>
+              </a:rPr>
+              <a:t>　　　　　　　　　　　</a:t>
+            </a:r>
+            <a:r>
+              <a:rPr kumimoji="0" lang="en-US" altLang="ja-JP" sz="2800" b="0" i="0" u="none" strike="noStrike" kern="0" cap="none" spc="0" normalizeH="0" baseline="0" noProof="0" dirty="0">
+                <a:ln>
+                  <a:noFill/>
+                </a:ln>
+                <a:solidFill>
+                  <a:srgbClr val="000000"/>
+                </a:solidFill>
+                <a:effectLst/>
+                <a:uLnTx/>
+                <a:uFillTx/>
+                <a:latin typeface="Courier New" panose="02070309020205020404" pitchFamily="49" charset="0"/>
+                <a:cs typeface="Courier New" panose="02070309020205020404" pitchFamily="49" charset="0"/>
+              </a:rPr>
+              <a:t>-1, 0, TB);</a:t>
+            </a:r>
+            <a:br>
+              <a:rPr kumimoji="0" lang="en-US" altLang="ja-JP" sz="2800" b="0" i="0" u="none" strike="noStrike" kern="0" cap="none" spc="0" normalizeH="0" baseline="0" noProof="0" dirty="0">
+                <a:ln>
+                  <a:noFill/>
+                </a:ln>
+                <a:solidFill>
+                  <a:srgbClr val="000000"/>
+                </a:solidFill>
+                <a:effectLst/>
+                <a:uLnTx/>
+                <a:uFillTx/>
+                <a:latin typeface="Courier New" panose="02070309020205020404" pitchFamily="49" charset="0"/>
+                <a:cs typeface="Courier New" panose="02070309020205020404" pitchFamily="49" charset="0"/>
+              </a:rPr>
+            </a:br>
+            <a:r>
+              <a:rPr kumimoji="0" lang="en-US" altLang="ja-JP" sz="2800" b="0" i="0" u="none" strike="noStrike" kern="0" cap="none" spc="0" normalizeH="0" baseline="0" noProof="0" dirty="0" err="1">
+                <a:ln>
+                  <a:noFill/>
+                </a:ln>
+                <a:solidFill>
+                  <a:srgbClr val="000000"/>
+                </a:solidFill>
+                <a:effectLst/>
+                <a:uLnTx/>
+                <a:uFillTx/>
+                <a:latin typeface="Courier New" panose="02070309020205020404" pitchFamily="49" charset="0"/>
+                <a:cs typeface="Courier New" panose="02070309020205020404" pitchFamily="49" charset="0"/>
+              </a:rPr>
+              <a:t>grid.addNeumannBoundary</a:t>
+            </a:r>
+            <a:r>
+              <a:rPr kumimoji="0" lang="en-US" altLang="ja-JP" sz="2800" b="0" i="0" u="none" strike="noStrike" kern="0" cap="none" spc="0" normalizeH="0" baseline="0" noProof="0" dirty="0">
+                <a:ln>
+                  <a:noFill/>
+                </a:ln>
+                <a:solidFill>
+                  <a:srgbClr val="000000"/>
+                </a:solidFill>
+                <a:effectLst/>
+                <a:uLnTx/>
+                <a:uFillTx/>
+                <a:latin typeface="Courier New" panose="02070309020205020404" pitchFamily="49" charset="0"/>
+                <a:cs typeface="Courier New" panose="02070309020205020404" pitchFamily="49" charset="0"/>
+              </a:rPr>
+              <a:t>(</a:t>
+            </a:r>
+            <a:br>
+              <a:rPr kumimoji="0" lang="en-US" altLang="ja-JP" sz="2800" b="0" i="0" u="none" strike="noStrike" kern="0" cap="none" spc="0" normalizeH="0" baseline="0" noProof="0" dirty="0">
+                <a:ln>
+                  <a:noFill/>
+                </a:ln>
+                <a:solidFill>
+                  <a:srgbClr val="000000"/>
+                </a:solidFill>
+                <a:effectLst/>
+                <a:uLnTx/>
+                <a:uFillTx/>
+                <a:latin typeface="Courier New" panose="02070309020205020404" pitchFamily="49" charset="0"/>
+                <a:cs typeface="Courier New" panose="02070309020205020404" pitchFamily="49" charset="0"/>
+              </a:rPr>
+            </a:br>
+            <a:r>
+              <a:rPr kumimoji="0" lang="en-US" altLang="ja-JP" sz="2800" b="0" i="0" u="none" strike="noStrike" kern="0" cap="none" spc="0" normalizeH="0" baseline="0" noProof="0" dirty="0">
+                <a:ln>
+                  <a:noFill/>
+                </a:ln>
+                <a:solidFill>
+                  <a:srgbClr val="000000"/>
+                </a:solidFill>
+                <a:effectLst/>
+                <a:uLnTx/>
+                <a:uFillTx/>
+                <a:latin typeface="Courier New" panose="02070309020205020404" pitchFamily="49" charset="0"/>
+                <a:cs typeface="Courier New" panose="02070309020205020404" pitchFamily="49" charset="0"/>
+              </a:rPr>
+              <a:t>     </a:t>
+            </a:r>
+            <a:r>
+              <a:rPr kumimoji="0" lang="ja-JP" altLang="en-US" sz="2800" b="0" i="0" u="none" strike="noStrike" kern="0" cap="none" spc="0" normalizeH="0" baseline="0" noProof="0" dirty="0">
+                <a:ln>
+                  <a:noFill/>
+                </a:ln>
+                <a:solidFill>
+                  <a:srgbClr val="000000"/>
+                </a:solidFill>
+                <a:effectLst/>
+                <a:uLnTx/>
+                <a:uFillTx/>
+                <a:latin typeface="Courier New" panose="02070309020205020404" pitchFamily="49" charset="0"/>
+                <a:cs typeface="Courier New" panose="02070309020205020404" pitchFamily="49" charset="0"/>
+              </a:rPr>
+              <a:t>　　　　　　　　　　</a:t>
+            </a:r>
+            <a:r>
+              <a:rPr kumimoji="0" lang="en-US" altLang="ja-JP" sz="2800" b="0" i="0" u="none" strike="noStrike" kern="0" cap="none" spc="0" normalizeH="0" baseline="0" noProof="0" dirty="0">
+                <a:ln>
+                  <a:noFill/>
+                </a:ln>
+                <a:solidFill>
+                  <a:srgbClr val="000000"/>
+                </a:solidFill>
+                <a:effectLst/>
+                <a:uLnTx/>
+                <a:uFillTx/>
+                <a:latin typeface="Courier New" panose="02070309020205020404" pitchFamily="49" charset="0"/>
+                <a:cs typeface="Courier New" panose="02070309020205020404" pitchFamily="49" charset="0"/>
+              </a:rPr>
+              <a:t>N, N-1, 0.0</a:t>
+            </a:r>
+            <a:r>
+              <a:rPr kumimoji="0" lang="en-US" altLang="ja-JP" sz="2800" b="0" i="0" u="none" strike="noStrike" kern="0" cap="none" spc="0" normalizeH="0" baseline="0" noProof="0" dirty="0" smtClean="0">
+                <a:ln>
+                  <a:noFill/>
+                </a:ln>
+                <a:solidFill>
+                  <a:srgbClr val="000000"/>
+                </a:solidFill>
+                <a:effectLst/>
+                <a:uLnTx/>
+                <a:uFillTx/>
+                <a:latin typeface="Courier New" panose="02070309020205020404" pitchFamily="49" charset="0"/>
+                <a:cs typeface="Courier New" panose="02070309020205020404" pitchFamily="49" charset="0"/>
+              </a:rPr>
+              <a:t>);</a:t>
+            </a:r>
+            <a:endParaRPr kumimoji="0" lang="en-US" altLang="ja-JP" sz="2800" b="0" i="0" u="none" strike="noStrike" kern="0" cap="none" spc="0" normalizeH="0" baseline="0" noProof="0" dirty="0" smtClean="0">
+              <a:ln>
+                <a:noFill/>
+              </a:ln>
+              <a:solidFill>
+                <a:srgbClr val="000000"/>
+              </a:solidFill>
+              <a:effectLst/>
+              <a:uLnTx/>
+              <a:uFillTx/>
+              <a:latin typeface="Courier New" panose="02070309020205020404" pitchFamily="49" charset="0"/>
+              <a:cs typeface="Courier New" panose="02070309020205020404" pitchFamily="49" charset="0"/>
+            </a:endParaRPr>
+          </a:p>
+        </p:txBody>
+      </p:sp>
+      <p:sp>
+        <p:nvSpPr>
+          <p:cNvPr id="115" name="正方形/長方形 114"/>
+          <p:cNvSpPr/>
+          <p:nvPr/>
+        </p:nvSpPr>
+        <p:spPr bwMode="blackGray">
+          <a:xfrm>
+            <a:off x="15788059" y="21841827"/>
+            <a:ext cx="7180104" cy="1358790"/>
+          </a:xfrm>
+          <a:prstGeom prst="rect">
+            <a:avLst/>
+          </a:prstGeom>
+          <a:solidFill>
+            <a:srgbClr val="808080">
+              <a:lumMod val="20000"/>
+              <a:lumOff val="80000"/>
+            </a:srgbClr>
+          </a:solidFill>
+          <a:ln w="9525">
+            <a:noFill/>
+            <a:round/>
+            <a:headEnd/>
+            <a:tailEnd/>
+          </a:ln>
+          <a:extLst/>
+        </p:spPr>
+        <p:txBody>
+          <a:bodyPr anchor="ctr"/>
+          <a:lstStyle/>
+          <a:p>
+            <a:pPr defTabSz="914400" fontAlgn="base">
+              <a:spcBef>
+                <a:spcPct val="0"/>
+              </a:spcBef>
+              <a:spcAft>
+                <a:spcPct val="0"/>
+              </a:spcAft>
+              <a:defRPr/>
+            </a:pPr>
+            <a:r>
+              <a:rPr lang="en-US" altLang="ja-JP" sz="2800" dirty="0">
+                <a:latin typeface="Courier New" panose="02070309020205020404" pitchFamily="49" charset="0"/>
+                <a:cs typeface="Courier New" panose="02070309020205020404" pitchFamily="49" charset="0"/>
+              </a:rPr>
+              <a:t> </a:t>
+            </a:r>
+            <a:r>
+              <a:rPr lang="en-US" altLang="ja-JP" sz="2800" dirty="0" smtClean="0">
+                <a:latin typeface="Courier New" panose="02070309020205020404" pitchFamily="49" charset="0"/>
+                <a:cs typeface="Courier New" panose="02070309020205020404" pitchFamily="49" charset="0"/>
+              </a:rPr>
+              <a:t>LA</a:t>
+            </a:r>
+            <a:r>
+              <a:rPr lang="en-US" altLang="ja-JP" sz="2800" dirty="0">
+                <a:latin typeface="Courier New" panose="02070309020205020404" pitchFamily="49" charset="0"/>
+                <a:cs typeface="Courier New" panose="02070309020205020404" pitchFamily="49" charset="0"/>
+              </a:rPr>
+              <a:t>::Vector b = </a:t>
+            </a:r>
+            <a:br>
+              <a:rPr lang="en-US" altLang="ja-JP" sz="2800" dirty="0">
+                <a:latin typeface="Courier New" panose="02070309020205020404" pitchFamily="49" charset="0"/>
+                <a:cs typeface="Courier New" panose="02070309020205020404" pitchFamily="49" charset="0"/>
+              </a:rPr>
+            </a:br>
+            <a:r>
+              <a:rPr lang="en-US" altLang="ja-JP" sz="2800" dirty="0">
+                <a:latin typeface="Courier New" panose="02070309020205020404" pitchFamily="49" charset="0"/>
+                <a:cs typeface="Courier New" panose="02070309020205020404" pitchFamily="49" charset="0"/>
+              </a:rPr>
+              <a:t>  </a:t>
+            </a:r>
+            <a:r>
+              <a:rPr lang="en-US" altLang="ja-JP" sz="2800" dirty="0" err="1">
+                <a:latin typeface="Courier New" panose="02070309020205020404" pitchFamily="49" charset="0"/>
+                <a:cs typeface="Courier New" panose="02070309020205020404" pitchFamily="49" charset="0"/>
+              </a:rPr>
+              <a:t>grid.discretizeFunction</a:t>
+            </a:r>
+            <a:r>
+              <a:rPr lang="en-US" altLang="ja-JP" sz="2800" dirty="0">
+                <a:latin typeface="Courier New" panose="02070309020205020404" pitchFamily="49" charset="0"/>
+                <a:cs typeface="Courier New" panose="02070309020205020404" pitchFamily="49" charset="0"/>
+              </a:rPr>
+              <a:t>(</a:t>
+            </a:r>
+            <a:br>
+              <a:rPr lang="en-US" altLang="ja-JP" sz="2800" dirty="0">
+                <a:latin typeface="Courier New" panose="02070309020205020404" pitchFamily="49" charset="0"/>
+                <a:cs typeface="Courier New" panose="02070309020205020404" pitchFamily="49" charset="0"/>
+              </a:rPr>
+            </a:br>
+            <a:r>
+              <a:rPr lang="en-US" altLang="ja-JP" sz="2800" dirty="0">
+                <a:latin typeface="Courier New" panose="02070309020205020404" pitchFamily="49" charset="0"/>
+                <a:cs typeface="Courier New" panose="02070309020205020404" pitchFamily="49" charset="0"/>
+              </a:rPr>
+              <a:t>          </a:t>
+            </a:r>
+            <a:r>
+              <a:rPr lang="ja-JP" altLang="en-US" sz="2800" dirty="0" smtClean="0">
+                <a:latin typeface="Courier New" panose="02070309020205020404" pitchFamily="49" charset="0"/>
+                <a:cs typeface="Courier New" panose="02070309020205020404" pitchFamily="49" charset="0"/>
+              </a:rPr>
+              <a:t>　　　　　　　　　</a:t>
+            </a:r>
+            <a:r>
+              <a:rPr lang="en-US" altLang="ja-JP" sz="2800" dirty="0" smtClean="0">
+                <a:latin typeface="Courier New" panose="02070309020205020404" pitchFamily="49" charset="0"/>
+                <a:cs typeface="Courier New" panose="02070309020205020404" pitchFamily="49" charset="0"/>
+              </a:rPr>
+              <a:t> </a:t>
+            </a:r>
+            <a:r>
+              <a:rPr lang="en-US" altLang="ja-JP" sz="2800" dirty="0">
+                <a:latin typeface="Courier New" panose="02070309020205020404" pitchFamily="49" charset="0"/>
+                <a:cs typeface="Courier New" panose="02070309020205020404" pitchFamily="49" charset="0"/>
+              </a:rPr>
+              <a:t>- s * TI </a:t>
+            </a:r>
+            <a:r>
+              <a:rPr lang="en-US" altLang="ja-JP" sz="2800" dirty="0" smtClean="0">
+                <a:latin typeface="Courier New" panose="02070309020205020404" pitchFamily="49" charset="0"/>
+                <a:cs typeface="Courier New" panose="02070309020205020404" pitchFamily="49" charset="0"/>
+              </a:rPr>
+              <a:t>);</a:t>
+            </a:r>
+            <a:endParaRPr lang="en-US" altLang="ja-JP" sz="2800" dirty="0" smtClean="0">
+              <a:latin typeface="Courier New" panose="02070309020205020404" pitchFamily="49" charset="0"/>
+              <a:cs typeface="Courier New" panose="02070309020205020404" pitchFamily="49" charset="0"/>
+            </a:endParaRPr>
+          </a:p>
+        </p:txBody>
+      </p:sp>
+      <p:sp>
+        <p:nvSpPr>
+          <p:cNvPr id="142" name="正方形/長方形 141"/>
+          <p:cNvSpPr/>
+          <p:nvPr/>
+        </p:nvSpPr>
+        <p:spPr bwMode="blackGray">
+          <a:xfrm>
+            <a:off x="15860067" y="32420462"/>
+            <a:ext cx="7180104" cy="2377288"/>
+          </a:xfrm>
+          <a:prstGeom prst="rect">
+            <a:avLst/>
+          </a:prstGeom>
+          <a:solidFill>
+            <a:srgbClr val="808080">
+              <a:lumMod val="20000"/>
+              <a:lumOff val="80000"/>
+            </a:srgbClr>
+          </a:solidFill>
+          <a:ln w="9525">
+            <a:noFill/>
+            <a:round/>
+            <a:headEnd/>
+            <a:tailEnd/>
+          </a:ln>
+          <a:extLst/>
+        </p:spPr>
+        <p:txBody>
+          <a:bodyPr anchor="ctr"/>
+          <a:lstStyle/>
+          <a:p>
+            <a:pPr>
+              <a:defRPr/>
+            </a:pPr>
+            <a:r>
+              <a:rPr lang="en-US" altLang="ja-JP" sz="2800" dirty="0" smtClean="0">
+                <a:latin typeface="Courier New" panose="02070309020205020404" pitchFamily="49" charset="0"/>
+                <a:cs typeface="Courier New" panose="02070309020205020404" pitchFamily="49" charset="0"/>
+              </a:rPr>
+              <a:t>FVM</a:t>
+            </a:r>
+            <a:r>
+              <a:rPr lang="en-US" altLang="ja-JP" sz="2800" dirty="0">
+                <a:latin typeface="Courier New" panose="02070309020205020404" pitchFamily="49" charset="0"/>
+                <a:cs typeface="Courier New" panose="02070309020205020404" pitchFamily="49" charset="0"/>
+              </a:rPr>
+              <a:t>::</a:t>
+            </a:r>
+            <a:r>
+              <a:rPr lang="en-US" altLang="ja-JP" sz="2800" dirty="0" err="1">
+                <a:latin typeface="Courier New" panose="02070309020205020404" pitchFamily="49" charset="0"/>
+                <a:cs typeface="Courier New" panose="02070309020205020404" pitchFamily="49" charset="0"/>
+              </a:rPr>
+              <a:t>BoundaryCorrector</a:t>
+            </a:r>
+            <a:r>
+              <a:rPr lang="en-US" altLang="ja-JP" sz="2800" dirty="0">
+                <a:latin typeface="Courier New" panose="02070309020205020404" pitchFamily="49" charset="0"/>
+                <a:cs typeface="Courier New" panose="02070309020205020404" pitchFamily="49" charset="0"/>
+              </a:rPr>
+              <a:t> </a:t>
+            </a:r>
+            <a:br>
+              <a:rPr lang="en-US" altLang="ja-JP" sz="2800" dirty="0">
+                <a:latin typeface="Courier New" panose="02070309020205020404" pitchFamily="49" charset="0"/>
+                <a:cs typeface="Courier New" panose="02070309020205020404" pitchFamily="49" charset="0"/>
+              </a:rPr>
+            </a:br>
+            <a:r>
+              <a:rPr lang="en-US" altLang="ja-JP" sz="2800" dirty="0">
+                <a:latin typeface="Courier New" panose="02070309020205020404" pitchFamily="49" charset="0"/>
+                <a:cs typeface="Courier New" panose="02070309020205020404" pitchFamily="49" charset="0"/>
+              </a:rPr>
+              <a:t>  </a:t>
+            </a:r>
+            <a:r>
+              <a:rPr lang="en-US" altLang="ja-JP" sz="2800" dirty="0" err="1">
+                <a:latin typeface="Courier New" panose="02070309020205020404" pitchFamily="49" charset="0"/>
+                <a:cs typeface="Courier New" panose="02070309020205020404" pitchFamily="49" charset="0"/>
+              </a:rPr>
+              <a:t>bCorrector</a:t>
+            </a:r>
+            <a:r>
+              <a:rPr lang="en-US" altLang="ja-JP" sz="2800" dirty="0">
+                <a:latin typeface="Courier New" panose="02070309020205020404" pitchFamily="49" charset="0"/>
+                <a:cs typeface="Courier New" panose="02070309020205020404" pitchFamily="49" charset="0"/>
+              </a:rPr>
+              <a:t>( grid, </a:t>
+            </a:r>
+            <a:r>
+              <a:rPr lang="en-US" altLang="ja-JP" sz="2800" dirty="0" err="1">
+                <a:latin typeface="Courier New" panose="02070309020205020404" pitchFamily="49" charset="0"/>
+                <a:cs typeface="Courier New" panose="02070309020205020404" pitchFamily="49" charset="0"/>
+              </a:rPr>
+              <a:t>opr</a:t>
+            </a:r>
+            <a:r>
+              <a:rPr lang="en-US" altLang="ja-JP" sz="2800" dirty="0">
+                <a:latin typeface="Courier New" panose="02070309020205020404" pitchFamily="49" charset="0"/>
+                <a:cs typeface="Courier New" panose="02070309020205020404" pitchFamily="49" charset="0"/>
+              </a:rPr>
+              <a:t>);</a:t>
+            </a:r>
+          </a:p>
+          <a:p>
+            <a:pPr>
+              <a:defRPr/>
+            </a:pPr>
+            <a:r>
+              <a:rPr lang="en-US" altLang="ja-JP" sz="2800" dirty="0">
+                <a:latin typeface="Courier New" panose="02070309020205020404" pitchFamily="49" charset="0"/>
+                <a:cs typeface="Courier New" panose="02070309020205020404" pitchFamily="49" charset="0"/>
+              </a:rPr>
+              <a:t/>
+            </a:r>
+            <a:br>
+              <a:rPr lang="en-US" altLang="ja-JP" sz="2800" dirty="0">
+                <a:latin typeface="Courier New" panose="02070309020205020404" pitchFamily="49" charset="0"/>
+                <a:cs typeface="Courier New" panose="02070309020205020404" pitchFamily="49" charset="0"/>
+              </a:rPr>
+            </a:br>
+            <a:r>
+              <a:rPr lang="en-US" altLang="ja-JP" sz="2800" dirty="0" err="1">
+                <a:latin typeface="Courier New" panose="02070309020205020404" pitchFamily="49" charset="0"/>
+                <a:cs typeface="Courier New" panose="02070309020205020404" pitchFamily="49" charset="0"/>
+              </a:rPr>
+              <a:t>bCorrector.applyTo</a:t>
+            </a:r>
+            <a:r>
+              <a:rPr lang="en-US" altLang="ja-JP" sz="2800" dirty="0">
+                <a:latin typeface="Courier New" panose="02070309020205020404" pitchFamily="49" charset="0"/>
+                <a:cs typeface="Courier New" panose="02070309020205020404" pitchFamily="49" charset="0"/>
+              </a:rPr>
+              <a:t>( C);</a:t>
+            </a:r>
+            <a:br>
+              <a:rPr lang="en-US" altLang="ja-JP" sz="2800" dirty="0">
+                <a:latin typeface="Courier New" panose="02070309020205020404" pitchFamily="49" charset="0"/>
+                <a:cs typeface="Courier New" panose="02070309020205020404" pitchFamily="49" charset="0"/>
+              </a:rPr>
+            </a:br>
+            <a:r>
+              <a:rPr lang="en-US" altLang="ja-JP" sz="2800" dirty="0" err="1">
+                <a:latin typeface="Courier New" panose="02070309020205020404" pitchFamily="49" charset="0"/>
+                <a:cs typeface="Courier New" panose="02070309020205020404" pitchFamily="49" charset="0"/>
+              </a:rPr>
+              <a:t>bCorrector.applyTo</a:t>
+            </a:r>
+            <a:r>
+              <a:rPr lang="en-US" altLang="ja-JP" sz="2800" dirty="0">
+                <a:latin typeface="Courier New" panose="02070309020205020404" pitchFamily="49" charset="0"/>
+                <a:cs typeface="Courier New" panose="02070309020205020404" pitchFamily="49" charset="0"/>
+              </a:rPr>
+              <a:t>( b</a:t>
+            </a:r>
+            <a:r>
+              <a:rPr lang="en-US" altLang="ja-JP" sz="2800" dirty="0" smtClean="0">
+                <a:latin typeface="Courier New" panose="02070309020205020404" pitchFamily="49" charset="0"/>
+                <a:cs typeface="Courier New" panose="02070309020205020404" pitchFamily="49" charset="0"/>
+              </a:rPr>
+              <a:t>);</a:t>
+            </a:r>
+            <a:endParaRPr kumimoji="0" lang="en-US" altLang="ja-JP" sz="2800" b="0" i="0" u="none" strike="noStrike" kern="0" cap="none" spc="0" normalizeH="0" baseline="0" noProof="0" dirty="0" smtClean="0">
+              <a:ln>
+                <a:noFill/>
+              </a:ln>
+              <a:solidFill>
+                <a:srgbClr val="000000"/>
+              </a:solidFill>
+              <a:effectLst/>
+              <a:uLnTx/>
+              <a:uFillTx/>
+              <a:latin typeface="Courier New" panose="02070309020205020404" pitchFamily="49" charset="0"/>
+              <a:cs typeface="Courier New" panose="02070309020205020404" pitchFamily="49" charset="0"/>
+            </a:endParaRPr>
+          </a:p>
+        </p:txBody>
+      </p:sp>
     </p:spTree>
     <p:extLst>
       <p:ext uri="{BB962C8B-B14F-4D97-AF65-F5344CB8AC3E}">

</xml_diff>